<commit_message>
Réutilisation des lat et lng en query de la , et réinitialisation champs formulaires AddRestaurant quand .query.lat change (clik ailleurs sur la carte)
</commit_message>
<xml_diff>
--- a/Soutenance/Présentation Projet 7.pptx
+++ b/Soutenance/Présentation Projet 7.pptx
@@ -114,6 +114,11 @@
       </a:defRPr>
     </a:lvl9pPr>
   </p:defaultTextStyle>
+  <p:extLst>
+    <p:ext uri="{EFAFB233-063F-42B5-8137-9DF3F51BA10A}">
+      <p15:sldGuideLst xmlns:p15="http://schemas.microsoft.com/office/powerpoint/2012/main"/>
+    </p:ext>
+  </p:extLst>
 </p:presentation>
 </file>
 
@@ -199,7 +204,7 @@
           <a:p>
             <a:fld id="{4D9A32CA-6F39-432B-8880-7503DE8A1282}" type="datetimeFigureOut">
               <a:rPr lang="en-US" smtClean="0"/>
-              <a:t>6/3/2019</a:t>
+              <a:t>6/4/2019</a:t>
             </a:fld>
             <a:endParaRPr lang="en-US"/>
           </a:p>
@@ -1137,7 +1142,7 @@
           <a:p>
             <a:fld id="{51079C1D-1EC4-4844-9068-A6E79EAA45C6}" type="datetimeFigureOut">
               <a:rPr lang="en-US" smtClean="0"/>
-              <a:t>6/3/2019</a:t>
+              <a:t>6/4/2019</a:t>
             </a:fld>
             <a:endParaRPr lang="en-US"/>
           </a:p>
@@ -1433,7 +1438,7 @@
           <a:p>
             <a:fld id="{51079C1D-1EC4-4844-9068-A6E79EAA45C6}" type="datetimeFigureOut">
               <a:rPr lang="en-US" smtClean="0"/>
-              <a:t>6/3/2019</a:t>
+              <a:t>6/4/2019</a:t>
             </a:fld>
             <a:endParaRPr lang="en-US"/>
           </a:p>
@@ -1681,7 +1686,7 @@
           <a:p>
             <a:fld id="{51079C1D-1EC4-4844-9068-A6E79EAA45C6}" type="datetimeFigureOut">
               <a:rPr lang="en-US" smtClean="0"/>
-              <a:t>6/3/2019</a:t>
+              <a:t>6/4/2019</a:t>
             </a:fld>
             <a:endParaRPr lang="en-US"/>
           </a:p>
@@ -2221,7 +2226,7 @@
           <a:p>
             <a:fld id="{51079C1D-1EC4-4844-9068-A6E79EAA45C6}" type="datetimeFigureOut">
               <a:rPr lang="en-US" smtClean="0"/>
-              <a:t>6/3/2019</a:t>
+              <a:t>6/4/2019</a:t>
             </a:fld>
             <a:endParaRPr lang="en-US"/>
           </a:p>
@@ -2469,7 +2474,7 @@
           <a:p>
             <a:fld id="{51079C1D-1EC4-4844-9068-A6E79EAA45C6}" type="datetimeFigureOut">
               <a:rPr lang="en-US" smtClean="0"/>
-              <a:t>6/3/2019</a:t>
+              <a:t>6/4/2019</a:t>
             </a:fld>
             <a:endParaRPr lang="en-US"/>
           </a:p>
@@ -3001,7 +3006,7 @@
           <a:p>
             <a:fld id="{51079C1D-1EC4-4844-9068-A6E79EAA45C6}" type="datetimeFigureOut">
               <a:rPr lang="en-US" smtClean="0"/>
-              <a:t>6/3/2019</a:t>
+              <a:t>6/4/2019</a:t>
             </a:fld>
             <a:endParaRPr lang="en-US"/>
           </a:p>
@@ -3298,7 +3303,7 @@
           <a:p>
             <a:fld id="{51079C1D-1EC4-4844-9068-A6E79EAA45C6}" type="datetimeFigureOut">
               <a:rPr lang="en-US" smtClean="0"/>
-              <a:t>6/3/2019</a:t>
+              <a:t>6/4/2019</a:t>
             </a:fld>
             <a:endParaRPr lang="en-US"/>
           </a:p>
@@ -3472,7 +3477,7 @@
           <a:p>
             <a:fld id="{51079C1D-1EC4-4844-9068-A6E79EAA45C6}" type="datetimeFigureOut">
               <a:rPr lang="en-US" smtClean="0"/>
-              <a:t>6/3/2019</a:t>
+              <a:t>6/4/2019</a:t>
             </a:fld>
             <a:endParaRPr lang="en-US"/>
           </a:p>
@@ -3652,7 +3657,7 @@
           <a:p>
             <a:fld id="{51079C1D-1EC4-4844-9068-A6E79EAA45C6}" type="datetimeFigureOut">
               <a:rPr lang="en-US" smtClean="0"/>
-              <a:t>6/3/2019</a:t>
+              <a:t>6/4/2019</a:t>
             </a:fld>
             <a:endParaRPr lang="en-US"/>
           </a:p>
@@ -3822,7 +3827,7 @@
           <a:p>
             <a:fld id="{51079C1D-1EC4-4844-9068-A6E79EAA45C6}" type="datetimeFigureOut">
               <a:rPr lang="en-US" smtClean="0"/>
-              <a:t>6/3/2019</a:t>
+              <a:t>6/4/2019</a:t>
             </a:fld>
             <a:endParaRPr lang="en-US"/>
           </a:p>
@@ -4073,7 +4078,7 @@
           <a:p>
             <a:fld id="{51079C1D-1EC4-4844-9068-A6E79EAA45C6}" type="datetimeFigureOut">
               <a:rPr lang="en-US" smtClean="0"/>
-              <a:t>6/3/2019</a:t>
+              <a:t>6/4/2019</a:t>
             </a:fld>
             <a:endParaRPr lang="en-US"/>
           </a:p>
@@ -4370,7 +4375,7 @@
           <a:p>
             <a:fld id="{51079C1D-1EC4-4844-9068-A6E79EAA45C6}" type="datetimeFigureOut">
               <a:rPr lang="en-US" smtClean="0"/>
-              <a:t>6/3/2019</a:t>
+              <a:t>6/4/2019</a:t>
             </a:fld>
             <a:endParaRPr lang="en-US"/>
           </a:p>
@@ -4812,7 +4817,7 @@
           <a:p>
             <a:fld id="{51079C1D-1EC4-4844-9068-A6E79EAA45C6}" type="datetimeFigureOut">
               <a:rPr lang="en-US" smtClean="0"/>
-              <a:t>6/3/2019</a:t>
+              <a:t>6/4/2019</a:t>
             </a:fld>
             <a:endParaRPr lang="en-US"/>
           </a:p>
@@ -4930,7 +4935,7 @@
           <a:p>
             <a:fld id="{51079C1D-1EC4-4844-9068-A6E79EAA45C6}" type="datetimeFigureOut">
               <a:rPr lang="en-US" smtClean="0"/>
-              <a:t>6/3/2019</a:t>
+              <a:t>6/4/2019</a:t>
             </a:fld>
             <a:endParaRPr lang="en-US"/>
           </a:p>
@@ -5025,7 +5030,7 @@
           <a:p>
             <a:fld id="{51079C1D-1EC4-4844-9068-A6E79EAA45C6}" type="datetimeFigureOut">
               <a:rPr lang="en-US" smtClean="0"/>
-              <a:t>6/3/2019</a:t>
+              <a:t>6/4/2019</a:t>
             </a:fld>
             <a:endParaRPr lang="en-US"/>
           </a:p>
@@ -5308,7 +5313,7 @@
           <a:p>
             <a:fld id="{51079C1D-1EC4-4844-9068-A6E79EAA45C6}" type="datetimeFigureOut">
               <a:rPr lang="en-US" smtClean="0"/>
-              <a:t>6/3/2019</a:t>
+              <a:t>6/4/2019</a:t>
             </a:fld>
             <a:endParaRPr lang="en-US"/>
           </a:p>
@@ -5599,7 +5604,7 @@
           <a:p>
             <a:fld id="{51079C1D-1EC4-4844-9068-A6E79EAA45C6}" type="datetimeFigureOut">
               <a:rPr lang="en-US" smtClean="0"/>
-              <a:t>6/3/2019</a:t>
+              <a:t>6/4/2019</a:t>
             </a:fld>
             <a:endParaRPr lang="en-US"/>
           </a:p>
@@ -6129,7 +6134,7 @@
           <a:p>
             <a:fld id="{51079C1D-1EC4-4844-9068-A6E79EAA45C6}" type="datetimeFigureOut">
               <a:rPr lang="en-US" smtClean="0"/>
-              <a:t>6/3/2019</a:t>
+              <a:t>6/4/2019</a:t>
             </a:fld>
             <a:endParaRPr lang="en-US"/>
           </a:p>
@@ -9142,7 +9147,7 @@
         <p:spPr>
           <a:xfrm>
             <a:off x="2347546" y="1251439"/>
-            <a:ext cx="9469316" cy="1754326"/>
+            <a:ext cx="9469316" cy="2308324"/>
           </a:xfrm>
           <a:prstGeom prst="rect">
             <a:avLst/>
@@ -9195,8 +9200,33 @@
                 <a:latin typeface="Arial" panose="020B0604020202020204" pitchFamily="34" charset="0"/>
                 <a:cs typeface="Arial" panose="020B0604020202020204" pitchFamily="34" charset="0"/>
               </a:rPr>
-              <a:t>Peaufiner le design et le choix des couleurs    </a:t>
-            </a:r>
+              <a:t>Peaufiner le design et le choix des couleurs </a:t>
+            </a:r>
+            <a:endParaRPr lang="fr-FR" dirty="0" smtClean="0">
+              <a:latin typeface="Arial" panose="020B0604020202020204" pitchFamily="34" charset="0"/>
+              <a:cs typeface="Arial" panose="020B0604020202020204" pitchFamily="34" charset="0"/>
+            </a:endParaRPr>
+          </a:p>
+          <a:p>
+            <a:pPr algn="just"/>
+            <a:endParaRPr lang="fr-FR" dirty="0">
+              <a:latin typeface="Arial" panose="020B0604020202020204" pitchFamily="34" charset="0"/>
+              <a:cs typeface="Arial" panose="020B0604020202020204" pitchFamily="34" charset="0"/>
+            </a:endParaRPr>
+          </a:p>
+          <a:p>
+            <a:pPr algn="just"/>
+            <a:r>
+              <a:rPr lang="fr-FR" dirty="0" smtClean="0">
+                <a:latin typeface="Arial" panose="020B0604020202020204" pitchFamily="34" charset="0"/>
+                <a:cs typeface="Arial" panose="020B0604020202020204" pitchFamily="34" charset="0"/>
+              </a:rPr>
+              <a:t>Intégrer la problématique de l’accessibilité   </a:t>
+            </a:r>
+            <a:endParaRPr lang="fr-FR" dirty="0" smtClean="0">
+              <a:latin typeface="Arial" panose="020B0604020202020204" pitchFamily="34" charset="0"/>
+              <a:cs typeface="Arial" panose="020B0604020202020204" pitchFamily="34" charset="0"/>
+            </a:endParaRPr>
           </a:p>
         </p:txBody>
       </p:sp>

</xml_diff>

<commit_message>
calcul moyenne des ratings corrigé
</commit_message>
<xml_diff>
--- a/Soutenance/Présentation Projet 7.pptx
+++ b/Soutenance/Présentation Projet 7.pptx
@@ -204,7 +204,7 @@
           <a:p>
             <a:fld id="{4D9A32CA-6F39-432B-8880-7503DE8A1282}" type="datetimeFigureOut">
               <a:rPr lang="en-US" smtClean="0"/>
-              <a:t>6/4/2019</a:t>
+              <a:t>6/12/2019</a:t>
             </a:fld>
             <a:endParaRPr lang="en-US"/>
           </a:p>
@@ -1142,7 +1142,7 @@
           <a:p>
             <a:fld id="{51079C1D-1EC4-4844-9068-A6E79EAA45C6}" type="datetimeFigureOut">
               <a:rPr lang="en-US" smtClean="0"/>
-              <a:t>6/4/2019</a:t>
+              <a:t>6/12/2019</a:t>
             </a:fld>
             <a:endParaRPr lang="en-US"/>
           </a:p>
@@ -1438,7 +1438,7 @@
           <a:p>
             <a:fld id="{51079C1D-1EC4-4844-9068-A6E79EAA45C6}" type="datetimeFigureOut">
               <a:rPr lang="en-US" smtClean="0"/>
-              <a:t>6/4/2019</a:t>
+              <a:t>6/12/2019</a:t>
             </a:fld>
             <a:endParaRPr lang="en-US"/>
           </a:p>
@@ -1686,7 +1686,7 @@
           <a:p>
             <a:fld id="{51079C1D-1EC4-4844-9068-A6E79EAA45C6}" type="datetimeFigureOut">
               <a:rPr lang="en-US" smtClean="0"/>
-              <a:t>6/4/2019</a:t>
+              <a:t>6/12/2019</a:t>
             </a:fld>
             <a:endParaRPr lang="en-US"/>
           </a:p>
@@ -2226,7 +2226,7 @@
           <a:p>
             <a:fld id="{51079C1D-1EC4-4844-9068-A6E79EAA45C6}" type="datetimeFigureOut">
               <a:rPr lang="en-US" smtClean="0"/>
-              <a:t>6/4/2019</a:t>
+              <a:t>6/12/2019</a:t>
             </a:fld>
             <a:endParaRPr lang="en-US"/>
           </a:p>
@@ -2474,7 +2474,7 @@
           <a:p>
             <a:fld id="{51079C1D-1EC4-4844-9068-A6E79EAA45C6}" type="datetimeFigureOut">
               <a:rPr lang="en-US" smtClean="0"/>
-              <a:t>6/4/2019</a:t>
+              <a:t>6/12/2019</a:t>
             </a:fld>
             <a:endParaRPr lang="en-US"/>
           </a:p>
@@ -3006,7 +3006,7 @@
           <a:p>
             <a:fld id="{51079C1D-1EC4-4844-9068-A6E79EAA45C6}" type="datetimeFigureOut">
               <a:rPr lang="en-US" smtClean="0"/>
-              <a:t>6/4/2019</a:t>
+              <a:t>6/12/2019</a:t>
             </a:fld>
             <a:endParaRPr lang="en-US"/>
           </a:p>
@@ -3303,7 +3303,7 @@
           <a:p>
             <a:fld id="{51079C1D-1EC4-4844-9068-A6E79EAA45C6}" type="datetimeFigureOut">
               <a:rPr lang="en-US" smtClean="0"/>
-              <a:t>6/4/2019</a:t>
+              <a:t>6/12/2019</a:t>
             </a:fld>
             <a:endParaRPr lang="en-US"/>
           </a:p>
@@ -3477,7 +3477,7 @@
           <a:p>
             <a:fld id="{51079C1D-1EC4-4844-9068-A6E79EAA45C6}" type="datetimeFigureOut">
               <a:rPr lang="en-US" smtClean="0"/>
-              <a:t>6/4/2019</a:t>
+              <a:t>6/12/2019</a:t>
             </a:fld>
             <a:endParaRPr lang="en-US"/>
           </a:p>
@@ -3657,7 +3657,7 @@
           <a:p>
             <a:fld id="{51079C1D-1EC4-4844-9068-A6E79EAA45C6}" type="datetimeFigureOut">
               <a:rPr lang="en-US" smtClean="0"/>
-              <a:t>6/4/2019</a:t>
+              <a:t>6/12/2019</a:t>
             </a:fld>
             <a:endParaRPr lang="en-US"/>
           </a:p>
@@ -3827,7 +3827,7 @@
           <a:p>
             <a:fld id="{51079C1D-1EC4-4844-9068-A6E79EAA45C6}" type="datetimeFigureOut">
               <a:rPr lang="en-US" smtClean="0"/>
-              <a:t>6/4/2019</a:t>
+              <a:t>6/12/2019</a:t>
             </a:fld>
             <a:endParaRPr lang="en-US"/>
           </a:p>
@@ -4078,7 +4078,7 @@
           <a:p>
             <a:fld id="{51079C1D-1EC4-4844-9068-A6E79EAA45C6}" type="datetimeFigureOut">
               <a:rPr lang="en-US" smtClean="0"/>
-              <a:t>6/4/2019</a:t>
+              <a:t>6/12/2019</a:t>
             </a:fld>
             <a:endParaRPr lang="en-US"/>
           </a:p>
@@ -4375,7 +4375,7 @@
           <a:p>
             <a:fld id="{51079C1D-1EC4-4844-9068-A6E79EAA45C6}" type="datetimeFigureOut">
               <a:rPr lang="en-US" smtClean="0"/>
-              <a:t>6/4/2019</a:t>
+              <a:t>6/12/2019</a:t>
             </a:fld>
             <a:endParaRPr lang="en-US"/>
           </a:p>
@@ -4817,7 +4817,7 @@
           <a:p>
             <a:fld id="{51079C1D-1EC4-4844-9068-A6E79EAA45C6}" type="datetimeFigureOut">
               <a:rPr lang="en-US" smtClean="0"/>
-              <a:t>6/4/2019</a:t>
+              <a:t>6/12/2019</a:t>
             </a:fld>
             <a:endParaRPr lang="en-US"/>
           </a:p>
@@ -4935,7 +4935,7 @@
           <a:p>
             <a:fld id="{51079C1D-1EC4-4844-9068-A6E79EAA45C6}" type="datetimeFigureOut">
               <a:rPr lang="en-US" smtClean="0"/>
-              <a:t>6/4/2019</a:t>
+              <a:t>6/12/2019</a:t>
             </a:fld>
             <a:endParaRPr lang="en-US"/>
           </a:p>
@@ -5030,7 +5030,7 @@
           <a:p>
             <a:fld id="{51079C1D-1EC4-4844-9068-A6E79EAA45C6}" type="datetimeFigureOut">
               <a:rPr lang="en-US" smtClean="0"/>
-              <a:t>6/4/2019</a:t>
+              <a:t>6/12/2019</a:t>
             </a:fld>
             <a:endParaRPr lang="en-US"/>
           </a:p>
@@ -5313,7 +5313,7 @@
           <a:p>
             <a:fld id="{51079C1D-1EC4-4844-9068-A6E79EAA45C6}" type="datetimeFigureOut">
               <a:rPr lang="en-US" smtClean="0"/>
-              <a:t>6/4/2019</a:t>
+              <a:t>6/12/2019</a:t>
             </a:fld>
             <a:endParaRPr lang="en-US"/>
           </a:p>
@@ -5604,7 +5604,7 @@
           <a:p>
             <a:fld id="{51079C1D-1EC4-4844-9068-A6E79EAA45C6}" type="datetimeFigureOut">
               <a:rPr lang="en-US" smtClean="0"/>
-              <a:t>6/4/2019</a:t>
+              <a:t>6/12/2019</a:t>
             </a:fld>
             <a:endParaRPr lang="en-US"/>
           </a:p>
@@ -6134,7 +6134,7 @@
           <a:p>
             <a:fld id="{51079C1D-1EC4-4844-9068-A6E79EAA45C6}" type="datetimeFigureOut">
               <a:rPr lang="en-US" smtClean="0"/>
-              <a:t>6/4/2019</a:t>
+              <a:t>6/12/2019</a:t>
             </a:fld>
             <a:endParaRPr lang="en-US"/>
           </a:p>
@@ -7760,7 +7760,14 @@
                 <a:latin typeface="Arial" panose="020B0604020202020204" pitchFamily="34" charset="0"/>
                 <a:cs typeface="Arial" panose="020B0604020202020204" pitchFamily="34" charset="0"/>
               </a:rPr>
-              <a:t>Header : titre + réseaux sociaux et stores</a:t>
+              <a:t>Header : titre + réseaux </a:t>
+            </a:r>
+            <a:r>
+              <a:rPr lang="fr-FR" sz="1200" dirty="0" smtClean="0">
+                <a:latin typeface="Arial" panose="020B0604020202020204" pitchFamily="34" charset="0"/>
+                <a:cs typeface="Arial" panose="020B0604020202020204" pitchFamily="34" charset="0"/>
+              </a:rPr>
+              <a:t>sociaux et stores</a:t>
             </a:r>
             <a:endParaRPr lang="en-US" sz="1200" dirty="0">
               <a:latin typeface="Arial" panose="020B0604020202020204" pitchFamily="34" charset="0"/>
@@ -8548,7 +8555,35 @@
                 <a:latin typeface="Arial" panose="020B0604020202020204" pitchFamily="34" charset="0"/>
                 <a:cs typeface="Arial" panose="020B0604020202020204" pitchFamily="34" charset="0"/>
               </a:rPr>
-              <a:t> à la liste JSON. Importé dans le Store</a:t>
+              <a:t> à la liste </a:t>
+            </a:r>
+            <a:r>
+              <a:rPr lang="fr-FR" dirty="0" smtClean="0">
+                <a:latin typeface="Arial" panose="020B0604020202020204" pitchFamily="34" charset="0"/>
+                <a:cs typeface="Arial" panose="020B0604020202020204" pitchFamily="34" charset="0"/>
+              </a:rPr>
+              <a:t>JSON + </a:t>
+            </a:r>
+            <a:r>
+              <a:rPr lang="fr-FR" dirty="0" err="1" smtClean="0">
+                <a:latin typeface="Arial" panose="020B0604020202020204" pitchFamily="34" charset="0"/>
+                <a:cs typeface="Arial" panose="020B0604020202020204" pitchFamily="34" charset="0"/>
+              </a:rPr>
+              <a:t>GooglePlaces</a:t>
+            </a:r>
+            <a:r>
+              <a:rPr lang="fr-FR" dirty="0" smtClean="0">
+                <a:latin typeface="Arial" panose="020B0604020202020204" pitchFamily="34" charset="0"/>
+                <a:cs typeface="Arial" panose="020B0604020202020204" pitchFamily="34" charset="0"/>
+              </a:rPr>
+              <a:t>. </a:t>
+            </a:r>
+            <a:r>
+              <a:rPr lang="fr-FR" dirty="0" smtClean="0">
+                <a:latin typeface="Arial" panose="020B0604020202020204" pitchFamily="34" charset="0"/>
+                <a:cs typeface="Arial" panose="020B0604020202020204" pitchFamily="34" charset="0"/>
+              </a:rPr>
+              <a:t>Importé dans le Store</a:t>
             </a:r>
           </a:p>
           <a:p>
@@ -9020,7 +9055,7 @@
         <p:spPr>
           <a:xfrm>
             <a:off x="2347546" y="1251439"/>
-            <a:ext cx="9469316" cy="1200329"/>
+            <a:ext cx="9469316" cy="2031325"/>
           </a:xfrm>
           <a:prstGeom prst="rect">
             <a:avLst/>
@@ -9059,8 +9094,39 @@
                 <a:latin typeface="Arial" panose="020B0604020202020204" pitchFamily="34" charset="0"/>
                 <a:cs typeface="Arial" panose="020B0604020202020204" pitchFamily="34" charset="0"/>
               </a:rPr>
-              <a:t>Intégrer l’API Google Places pour afficher plus de restaurants et de commentaires autour de la position de l’utilisateur</a:t>
-            </a:r>
+              <a:t>Intégrer l’API Google Places pour afficher plus de restaurants et de commentaires autour de la position de </a:t>
+            </a:r>
+            <a:r>
+              <a:rPr lang="fr-FR" dirty="0" smtClean="0">
+                <a:latin typeface="Arial" panose="020B0604020202020204" pitchFamily="34" charset="0"/>
+                <a:cs typeface="Arial" panose="020B0604020202020204" pitchFamily="34" charset="0"/>
+              </a:rPr>
+              <a:t>l’utilisateur</a:t>
+            </a:r>
+          </a:p>
+          <a:p>
+            <a:pPr marL="285750" indent="-285750" algn="just">
+              <a:buFontTx/>
+              <a:buChar char="-"/>
+            </a:pPr>
+            <a:endParaRPr lang="fr-FR" dirty="0">
+              <a:latin typeface="Arial" panose="020B0604020202020204" pitchFamily="34" charset="0"/>
+              <a:cs typeface="Arial" panose="020B0604020202020204" pitchFamily="34" charset="0"/>
+            </a:endParaRPr>
+          </a:p>
+          <a:p>
+            <a:pPr algn="just"/>
+            <a:r>
+              <a:rPr lang="fr-FR" dirty="0" smtClean="0">
+                <a:latin typeface="Arial" panose="020B0604020202020204" pitchFamily="34" charset="0"/>
+                <a:cs typeface="Arial" panose="020B0604020202020204" pitchFamily="34" charset="0"/>
+              </a:rPr>
+              <a:t>Le choix a été fait d’afficher les restaurants autour de la position de l’utilisateur, et non de prévoir un champ recherche, pas assez ciblé et direct.</a:t>
+            </a:r>
+            <a:endParaRPr lang="fr-FR" dirty="0" smtClean="0">
+              <a:latin typeface="Arial" panose="020B0604020202020204" pitchFamily="34" charset="0"/>
+              <a:cs typeface="Arial" panose="020B0604020202020204" pitchFamily="34" charset="0"/>
+            </a:endParaRPr>
           </a:p>
         </p:txBody>
       </p:sp>
@@ -9147,7 +9213,7 @@
         <p:spPr>
           <a:xfrm>
             <a:off x="2347546" y="1251439"/>
-            <a:ext cx="9469316" cy="2308324"/>
+            <a:ext cx="9469316" cy="3139321"/>
           </a:xfrm>
           <a:prstGeom prst="rect">
             <a:avLst/>
@@ -9202,10 +9268,6 @@
               </a:rPr>
               <a:t>Peaufiner le design et le choix des couleurs </a:t>
             </a:r>
-            <a:endParaRPr lang="fr-FR" dirty="0" smtClean="0">
-              <a:latin typeface="Arial" panose="020B0604020202020204" pitchFamily="34" charset="0"/>
-              <a:cs typeface="Arial" panose="020B0604020202020204" pitchFamily="34" charset="0"/>
-            </a:endParaRPr>
           </a:p>
           <a:p>
             <a:pPr algn="just"/>
@@ -9221,7 +9283,38 @@
                 <a:latin typeface="Arial" panose="020B0604020202020204" pitchFamily="34" charset="0"/>
                 <a:cs typeface="Arial" panose="020B0604020202020204" pitchFamily="34" charset="0"/>
               </a:rPr>
-              <a:t>Intégrer la problématique de l’accessibilité   </a:t>
+              <a:t>Intégrer la problématique de l’accessibilité  </a:t>
+            </a:r>
+            <a:endParaRPr lang="fr-FR" dirty="0" smtClean="0">
+              <a:latin typeface="Arial" panose="020B0604020202020204" pitchFamily="34" charset="0"/>
+              <a:cs typeface="Arial" panose="020B0604020202020204" pitchFamily="34" charset="0"/>
+            </a:endParaRPr>
+          </a:p>
+          <a:p>
+            <a:pPr algn="just"/>
+            <a:endParaRPr lang="fr-FR" dirty="0">
+              <a:latin typeface="Arial" panose="020B0604020202020204" pitchFamily="34" charset="0"/>
+              <a:cs typeface="Arial" panose="020B0604020202020204" pitchFamily="34" charset="0"/>
+            </a:endParaRPr>
+          </a:p>
+          <a:p>
+            <a:pPr algn="just"/>
+            <a:r>
+              <a:rPr lang="fr-FR" dirty="0" smtClean="0">
+                <a:latin typeface="Arial" panose="020B0604020202020204" pitchFamily="34" charset="0"/>
+                <a:cs typeface="Arial" panose="020B0604020202020204" pitchFamily="34" charset="0"/>
+              </a:rPr>
+              <a:t>Mieux étudier l’implémentation de Google Places : </a:t>
+            </a:r>
+          </a:p>
+          <a:p>
+            <a:pPr algn="just"/>
+            <a:r>
+              <a:rPr lang="fr-FR" dirty="0" smtClean="0">
+                <a:latin typeface="Arial" panose="020B0604020202020204" pitchFamily="34" charset="0"/>
+                <a:cs typeface="Arial" panose="020B0604020202020204" pitchFamily="34" charset="0"/>
+              </a:rPr>
+              <a:t>- Afficher tous les restaurants sur la carte </a:t>
             </a:r>
             <a:endParaRPr lang="fr-FR" dirty="0" smtClean="0">
               <a:latin typeface="Arial" panose="020B0604020202020204" pitchFamily="34" charset="0"/>

</xml_diff>

<commit_message>
dernières corrections de bugs, les markers fonctionnent normalement avec l'ajout de :key = 'marker'.
</commit_message>
<xml_diff>
--- a/Soutenance/Présentation Projet 7.pptx
+++ b/Soutenance/Présentation Projet 7.pptx
@@ -5,17 +5,19 @@
     <p:sldMasterId id="2147483696" r:id="rId1"/>
   </p:sldMasterIdLst>
   <p:notesMasterIdLst>
-    <p:notesMasterId r:id="rId10"/>
+    <p:notesMasterId r:id="rId12"/>
   </p:notesMasterIdLst>
   <p:sldIdLst>
     <p:sldId id="256" r:id="rId2"/>
     <p:sldId id="257" r:id="rId3"/>
-    <p:sldId id="260" r:id="rId4"/>
-    <p:sldId id="261" r:id="rId5"/>
-    <p:sldId id="262" r:id="rId6"/>
-    <p:sldId id="258" r:id="rId7"/>
-    <p:sldId id="259" r:id="rId8"/>
-    <p:sldId id="263" r:id="rId9"/>
+    <p:sldId id="264" r:id="rId4"/>
+    <p:sldId id="262" r:id="rId5"/>
+    <p:sldId id="261" r:id="rId6"/>
+    <p:sldId id="260" r:id="rId7"/>
+    <p:sldId id="258" r:id="rId8"/>
+    <p:sldId id="259" r:id="rId9"/>
+    <p:sldId id="263" r:id="rId10"/>
+    <p:sldId id="265" r:id="rId11"/>
   </p:sldIdLst>
   <p:sldSz cx="12192000" cy="6858000"/>
   <p:notesSz cx="6858000" cy="9144000"/>
@@ -204,7 +206,7 @@
           <a:p>
             <a:fld id="{4D9A32CA-6F39-432B-8880-7503DE8A1282}" type="datetimeFigureOut">
               <a:rPr lang="en-US" smtClean="0"/>
-              <a:t>6/12/2019</a:t>
+              <a:t>6/22/2019</a:t>
             </a:fld>
             <a:endParaRPr lang="en-US"/>
           </a:p>
@@ -546,7 +548,7 @@
     </p:spTree>
     <p:extLst>
       <p:ext uri="{BB962C8B-B14F-4D97-AF65-F5344CB8AC3E}">
-        <p14:creationId xmlns:p14="http://schemas.microsoft.com/office/powerpoint/2010/main" val="134998885"/>
+        <p14:creationId xmlns:p14="http://schemas.microsoft.com/office/powerpoint/2010/main" val="730639258"/>
       </p:ext>
     </p:extLst>
   </p:cSld>
@@ -630,7 +632,7 @@
     </p:spTree>
     <p:extLst>
       <p:ext uri="{BB962C8B-B14F-4D97-AF65-F5344CB8AC3E}">
-        <p14:creationId xmlns:p14="http://schemas.microsoft.com/office/powerpoint/2010/main" val="730639258"/>
+        <p14:creationId xmlns:p14="http://schemas.microsoft.com/office/powerpoint/2010/main" val="134998885"/>
       </p:ext>
     </p:extLst>
   </p:cSld>
@@ -1142,7 +1144,7 @@
           <a:p>
             <a:fld id="{51079C1D-1EC4-4844-9068-A6E79EAA45C6}" type="datetimeFigureOut">
               <a:rPr lang="en-US" smtClean="0"/>
-              <a:t>6/12/2019</a:t>
+              <a:t>6/22/2019</a:t>
             </a:fld>
             <a:endParaRPr lang="en-US"/>
           </a:p>
@@ -1438,7 +1440,7 @@
           <a:p>
             <a:fld id="{51079C1D-1EC4-4844-9068-A6E79EAA45C6}" type="datetimeFigureOut">
               <a:rPr lang="en-US" smtClean="0"/>
-              <a:t>6/12/2019</a:t>
+              <a:t>6/22/2019</a:t>
             </a:fld>
             <a:endParaRPr lang="en-US"/>
           </a:p>
@@ -1686,7 +1688,7 @@
           <a:p>
             <a:fld id="{51079C1D-1EC4-4844-9068-A6E79EAA45C6}" type="datetimeFigureOut">
               <a:rPr lang="en-US" smtClean="0"/>
-              <a:t>6/12/2019</a:t>
+              <a:t>6/22/2019</a:t>
             </a:fld>
             <a:endParaRPr lang="en-US"/>
           </a:p>
@@ -2226,7 +2228,7 @@
           <a:p>
             <a:fld id="{51079C1D-1EC4-4844-9068-A6E79EAA45C6}" type="datetimeFigureOut">
               <a:rPr lang="en-US" smtClean="0"/>
-              <a:t>6/12/2019</a:t>
+              <a:t>6/22/2019</a:t>
             </a:fld>
             <a:endParaRPr lang="en-US"/>
           </a:p>
@@ -2474,7 +2476,7 @@
           <a:p>
             <a:fld id="{51079C1D-1EC4-4844-9068-A6E79EAA45C6}" type="datetimeFigureOut">
               <a:rPr lang="en-US" smtClean="0"/>
-              <a:t>6/12/2019</a:t>
+              <a:t>6/22/2019</a:t>
             </a:fld>
             <a:endParaRPr lang="en-US"/>
           </a:p>
@@ -3006,7 +3008,7 @@
           <a:p>
             <a:fld id="{51079C1D-1EC4-4844-9068-A6E79EAA45C6}" type="datetimeFigureOut">
               <a:rPr lang="en-US" smtClean="0"/>
-              <a:t>6/12/2019</a:t>
+              <a:t>6/22/2019</a:t>
             </a:fld>
             <a:endParaRPr lang="en-US"/>
           </a:p>
@@ -3303,7 +3305,7 @@
           <a:p>
             <a:fld id="{51079C1D-1EC4-4844-9068-A6E79EAA45C6}" type="datetimeFigureOut">
               <a:rPr lang="en-US" smtClean="0"/>
-              <a:t>6/12/2019</a:t>
+              <a:t>6/22/2019</a:t>
             </a:fld>
             <a:endParaRPr lang="en-US"/>
           </a:p>
@@ -3477,7 +3479,7 @@
           <a:p>
             <a:fld id="{51079C1D-1EC4-4844-9068-A6E79EAA45C6}" type="datetimeFigureOut">
               <a:rPr lang="en-US" smtClean="0"/>
-              <a:t>6/12/2019</a:t>
+              <a:t>6/22/2019</a:t>
             </a:fld>
             <a:endParaRPr lang="en-US"/>
           </a:p>
@@ -3657,7 +3659,7 @@
           <a:p>
             <a:fld id="{51079C1D-1EC4-4844-9068-A6E79EAA45C6}" type="datetimeFigureOut">
               <a:rPr lang="en-US" smtClean="0"/>
-              <a:t>6/12/2019</a:t>
+              <a:t>6/22/2019</a:t>
             </a:fld>
             <a:endParaRPr lang="en-US"/>
           </a:p>
@@ -3827,7 +3829,7 @@
           <a:p>
             <a:fld id="{51079C1D-1EC4-4844-9068-A6E79EAA45C6}" type="datetimeFigureOut">
               <a:rPr lang="en-US" smtClean="0"/>
-              <a:t>6/12/2019</a:t>
+              <a:t>6/22/2019</a:t>
             </a:fld>
             <a:endParaRPr lang="en-US"/>
           </a:p>
@@ -4078,7 +4080,7 @@
           <a:p>
             <a:fld id="{51079C1D-1EC4-4844-9068-A6E79EAA45C6}" type="datetimeFigureOut">
               <a:rPr lang="en-US" smtClean="0"/>
-              <a:t>6/12/2019</a:t>
+              <a:t>6/22/2019</a:t>
             </a:fld>
             <a:endParaRPr lang="en-US"/>
           </a:p>
@@ -4375,7 +4377,7 @@
           <a:p>
             <a:fld id="{51079C1D-1EC4-4844-9068-A6E79EAA45C6}" type="datetimeFigureOut">
               <a:rPr lang="en-US" smtClean="0"/>
-              <a:t>6/12/2019</a:t>
+              <a:t>6/22/2019</a:t>
             </a:fld>
             <a:endParaRPr lang="en-US"/>
           </a:p>
@@ -4817,7 +4819,7 @@
           <a:p>
             <a:fld id="{51079C1D-1EC4-4844-9068-A6E79EAA45C6}" type="datetimeFigureOut">
               <a:rPr lang="en-US" smtClean="0"/>
-              <a:t>6/12/2019</a:t>
+              <a:t>6/22/2019</a:t>
             </a:fld>
             <a:endParaRPr lang="en-US"/>
           </a:p>
@@ -4935,7 +4937,7 @@
           <a:p>
             <a:fld id="{51079C1D-1EC4-4844-9068-A6E79EAA45C6}" type="datetimeFigureOut">
               <a:rPr lang="en-US" smtClean="0"/>
-              <a:t>6/12/2019</a:t>
+              <a:t>6/22/2019</a:t>
             </a:fld>
             <a:endParaRPr lang="en-US"/>
           </a:p>
@@ -5030,7 +5032,7 @@
           <a:p>
             <a:fld id="{51079C1D-1EC4-4844-9068-A6E79EAA45C6}" type="datetimeFigureOut">
               <a:rPr lang="en-US" smtClean="0"/>
-              <a:t>6/12/2019</a:t>
+              <a:t>6/22/2019</a:t>
             </a:fld>
             <a:endParaRPr lang="en-US"/>
           </a:p>
@@ -5313,7 +5315,7 @@
           <a:p>
             <a:fld id="{51079C1D-1EC4-4844-9068-A6E79EAA45C6}" type="datetimeFigureOut">
               <a:rPr lang="en-US" smtClean="0"/>
-              <a:t>6/12/2019</a:t>
+              <a:t>6/22/2019</a:t>
             </a:fld>
             <a:endParaRPr lang="en-US"/>
           </a:p>
@@ -5604,7 +5606,7 @@
           <a:p>
             <a:fld id="{51079C1D-1EC4-4844-9068-A6E79EAA45C6}" type="datetimeFigureOut">
               <a:rPr lang="en-US" smtClean="0"/>
-              <a:t>6/12/2019</a:t>
+              <a:t>6/22/2019</a:t>
             </a:fld>
             <a:endParaRPr lang="en-US"/>
           </a:p>
@@ -6134,7 +6136,7 @@
           <a:p>
             <a:fld id="{51079C1D-1EC4-4844-9068-A6E79EAA45C6}" type="datetimeFigureOut">
               <a:rPr lang="en-US" smtClean="0"/>
-              <a:t>6/12/2019</a:t>
+              <a:t>6/22/2019</a:t>
             </a:fld>
             <a:endParaRPr lang="en-US"/>
           </a:p>
@@ -6769,6 +6771,117 @@
 </p:sld>
 </file>
 
+<file path=ppt/slides/slide10.xml><?xml version="1.0" encoding="utf-8"?>
+<p:sld xmlns:a="http://schemas.openxmlformats.org/drawingml/2006/main" xmlns:r="http://schemas.openxmlformats.org/officeDocument/2006/relationships" xmlns:p="http://schemas.openxmlformats.org/presentationml/2006/main">
+  <p:cSld>
+    <p:spTree>
+      <p:nvGrpSpPr>
+        <p:cNvPr id="1" name=""/>
+        <p:cNvGrpSpPr/>
+        <p:nvPr/>
+      </p:nvGrpSpPr>
+      <p:grpSpPr>
+        <a:xfrm>
+          <a:off x="0" y="0"/>
+          <a:ext cx="0" cy="0"/>
+          <a:chOff x="0" y="0"/>
+          <a:chExt cx="0" cy="0"/>
+        </a:xfrm>
+      </p:grpSpPr>
+      <p:sp>
+        <p:nvSpPr>
+          <p:cNvPr id="5" name="TextBox 4"/>
+          <p:cNvSpPr txBox="1"/>
+          <p:nvPr/>
+        </p:nvSpPr>
+        <p:spPr>
+          <a:xfrm>
+            <a:off x="2347546" y="334108"/>
+            <a:ext cx="9469316" cy="400110"/>
+          </a:xfrm>
+          <a:prstGeom prst="rect">
+            <a:avLst/>
+          </a:prstGeom>
+          <a:noFill/>
+        </p:spPr>
+        <p:txBody>
+          <a:bodyPr wrap="square" rtlCol="0">
+            <a:spAutoFit/>
+          </a:bodyPr>
+          <a:lstStyle/>
+          <a:p>
+            <a:pPr algn="ctr"/>
+            <a:r>
+              <a:rPr lang="fr-FR" sz="2000" b="1" dirty="0" smtClean="0">
+                <a:latin typeface="Arial" panose="020B0604020202020204" pitchFamily="34" charset="0"/>
+                <a:cs typeface="Arial" panose="020B0604020202020204" pitchFamily="34" charset="0"/>
+              </a:rPr>
+              <a:t>Fin de la présentation</a:t>
+            </a:r>
+            <a:endParaRPr lang="en-US" sz="2000" b="1" dirty="0">
+              <a:latin typeface="Arial" panose="020B0604020202020204" pitchFamily="34" charset="0"/>
+              <a:cs typeface="Arial" panose="020B0604020202020204" pitchFamily="34" charset="0"/>
+            </a:endParaRPr>
+          </a:p>
+        </p:txBody>
+      </p:sp>
+      <p:sp>
+        <p:nvSpPr>
+          <p:cNvPr id="6" name="TextBox 5"/>
+          <p:cNvSpPr txBox="1"/>
+          <p:nvPr/>
+        </p:nvSpPr>
+        <p:spPr>
+          <a:xfrm>
+            <a:off x="2347546" y="1805358"/>
+            <a:ext cx="9469316" cy="369332"/>
+          </a:xfrm>
+          <a:prstGeom prst="rect">
+            <a:avLst/>
+          </a:prstGeom>
+          <a:noFill/>
+        </p:spPr>
+        <p:txBody>
+          <a:bodyPr wrap="square" rtlCol="0">
+            <a:spAutoFit/>
+          </a:bodyPr>
+          <a:lstStyle/>
+          <a:p>
+            <a:pPr algn="ctr"/>
+            <a:r>
+              <a:rPr lang="fr-FR" dirty="0" smtClean="0">
+                <a:latin typeface="Arial" panose="020B0604020202020204" pitchFamily="34" charset="0"/>
+                <a:cs typeface="Arial" panose="020B0604020202020204" pitchFamily="34" charset="0"/>
+              </a:rPr>
+              <a:t>Merci pour l’attention accordée à ce projet</a:t>
+            </a:r>
+            <a:endParaRPr lang="fr-FR" dirty="0" smtClean="0">
+              <a:latin typeface="Arial" panose="020B0604020202020204" pitchFamily="34" charset="0"/>
+              <a:cs typeface="Arial" panose="020B0604020202020204" pitchFamily="34" charset="0"/>
+            </a:endParaRPr>
+          </a:p>
+        </p:txBody>
+      </p:sp>
+    </p:spTree>
+    <p:extLst>
+      <p:ext uri="{BB962C8B-B14F-4D97-AF65-F5344CB8AC3E}">
+        <p14:creationId xmlns:p14="http://schemas.microsoft.com/office/powerpoint/2010/main" val="3816521381"/>
+      </p:ext>
+    </p:extLst>
+  </p:cSld>
+  <p:clrMapOvr>
+    <a:masterClrMapping/>
+  </p:clrMapOvr>
+  <p:timing>
+    <p:tnLst>
+      <p:par>
+        <p:cTn id="1" dur="indefinite" restart="never" nodeType="tmRoot"/>
+      </p:par>
+    </p:tnLst>
+  </p:timing>
+</p:sld>
+</file>
+
 <file path=ppt/slides/slide2.xml><?xml version="1.0" encoding="utf-8"?>
 <p:sld xmlns:a="http://schemas.openxmlformats.org/drawingml/2006/main" xmlns:r="http://schemas.openxmlformats.org/officeDocument/2006/relationships" xmlns:p="http://schemas.openxmlformats.org/presentationml/2006/main">
   <p:cSld>
@@ -6832,7 +6945,7 @@
         <p:spPr>
           <a:xfrm>
             <a:off x="2347546" y="1251439"/>
-            <a:ext cx="9469316" cy="4524315"/>
+            <a:ext cx="9469316" cy="5078313"/>
           </a:xfrm>
           <a:prstGeom prst="rect">
             <a:avLst/>
@@ -6991,8 +7104,26 @@
                 <a:latin typeface="Arial" panose="020B0604020202020204" pitchFamily="34" charset="0"/>
                 <a:cs typeface="Arial" panose="020B0604020202020204" pitchFamily="34" charset="0"/>
               </a:rPr>
-              <a:t>, plugin Vue de Chrome</a:t>
-            </a:r>
+              <a:t>, plugin Vue de </a:t>
+            </a:r>
+            <a:r>
+              <a:rPr lang="fr-FR" dirty="0" smtClean="0">
+                <a:latin typeface="Arial" panose="020B0604020202020204" pitchFamily="34" charset="0"/>
+                <a:cs typeface="Arial" panose="020B0604020202020204" pitchFamily="34" charset="0"/>
+              </a:rPr>
+              <a:t>Chrome </a:t>
+            </a:r>
+            <a:r>
+              <a:rPr lang="fr-FR" dirty="0" err="1" smtClean="0">
+                <a:latin typeface="Arial" panose="020B0604020202020204" pitchFamily="34" charset="0"/>
+                <a:cs typeface="Arial" panose="020B0604020202020204" pitchFamily="34" charset="0"/>
+              </a:rPr>
+              <a:t>DevTools</a:t>
+            </a:r>
+            <a:endParaRPr lang="fr-FR" dirty="0" smtClean="0">
+              <a:latin typeface="Arial" panose="020B0604020202020204" pitchFamily="34" charset="0"/>
+              <a:cs typeface="Arial" panose="020B0604020202020204" pitchFamily="34" charset="0"/>
+            </a:endParaRPr>
           </a:p>
           <a:p>
             <a:pPr marL="285750" indent="-285750" algn="just">
@@ -7014,7 +7145,14 @@
                 <a:latin typeface="Arial" panose="020B0604020202020204" pitchFamily="34" charset="0"/>
                 <a:cs typeface="Arial" panose="020B0604020202020204" pitchFamily="34" charset="0"/>
               </a:rPr>
-              <a:t>Continuer à apprendre à séparer mon code (composants) pour en faciliter la maintenance et la réutilisation</a:t>
+              <a:t>Continuer à apprendre à séparer mon code (composants) pour en faciliter la maintenance et la </a:t>
+            </a:r>
+            <a:r>
+              <a:rPr lang="fr-FR" dirty="0" smtClean="0">
+                <a:latin typeface="Arial" panose="020B0604020202020204" pitchFamily="34" charset="0"/>
+                <a:cs typeface="Arial" panose="020B0604020202020204" pitchFamily="34" charset="0"/>
+              </a:rPr>
+              <a:t>réutilisation</a:t>
             </a:r>
           </a:p>
           <a:p>
@@ -7022,6 +7160,59 @@
               <a:buFontTx/>
               <a:buChar char="-"/>
             </a:pPr>
+            <a:endParaRPr lang="fr-FR" dirty="0">
+              <a:latin typeface="Arial" panose="020B0604020202020204" pitchFamily="34" charset="0"/>
+              <a:cs typeface="Arial" panose="020B0604020202020204" pitchFamily="34" charset="0"/>
+            </a:endParaRPr>
+          </a:p>
+          <a:p>
+            <a:pPr marL="285750" indent="-285750" algn="just">
+              <a:buFontTx/>
+              <a:buChar char="-"/>
+            </a:pPr>
+            <a:r>
+              <a:rPr lang="fr-FR" dirty="0" smtClean="0">
+                <a:latin typeface="Arial" panose="020B0604020202020204" pitchFamily="34" charset="0"/>
+                <a:cs typeface="Arial" panose="020B0604020202020204" pitchFamily="34" charset="0"/>
+              </a:rPr>
+              <a:t>Défi supplémentaire lié au projet : ne pas pouvoir utiliser le </a:t>
+            </a:r>
+            <a:r>
+              <a:rPr lang="fr-FR" dirty="0" smtClean="0">
+                <a:latin typeface="Arial" panose="020B0604020202020204" pitchFamily="34" charset="0"/>
+                <a:cs typeface="Arial" panose="020B0604020202020204" pitchFamily="34" charset="0"/>
+                <a:hlinkClick r:id="rId2"/>
+              </a:rPr>
+              <a:t>plugin de Vue </a:t>
+            </a:r>
+            <a:endParaRPr lang="fr-FR" dirty="0" smtClean="0">
+              <a:latin typeface="Arial" panose="020B0604020202020204" pitchFamily="34" charset="0"/>
+              <a:cs typeface="Arial" panose="020B0604020202020204" pitchFamily="34" charset="0"/>
+            </a:endParaRPr>
+          </a:p>
+          <a:p>
+            <a:pPr algn="just"/>
+            <a:r>
+              <a:rPr lang="fr-FR" dirty="0" smtClean="0">
+                <a:latin typeface="Arial" panose="020B0604020202020204" pitchFamily="34" charset="0"/>
+                <a:cs typeface="Arial" panose="020B0604020202020204" pitchFamily="34" charset="0"/>
+              </a:rPr>
+              <a:t>dédié à Google </a:t>
+            </a:r>
+            <a:r>
+              <a:rPr lang="fr-FR" dirty="0" err="1" smtClean="0">
+                <a:latin typeface="Arial" panose="020B0604020202020204" pitchFamily="34" charset="0"/>
+                <a:cs typeface="Arial" panose="020B0604020202020204" pitchFamily="34" charset="0"/>
+              </a:rPr>
+              <a:t>Maps</a:t>
+            </a:r>
+            <a:r>
+              <a:rPr lang="fr-FR" dirty="0" smtClean="0">
+                <a:latin typeface="Arial" panose="020B0604020202020204" pitchFamily="34" charset="0"/>
+                <a:cs typeface="Arial" panose="020B0604020202020204" pitchFamily="34" charset="0"/>
+              </a:rPr>
+              <a:t>.</a:t>
+            </a:r>
             <a:endParaRPr lang="fr-FR" dirty="0">
               <a:latin typeface="Arial" panose="020B0604020202020204" pitchFamily="34" charset="0"/>
               <a:cs typeface="Arial" panose="020B0604020202020204" pitchFamily="34" charset="0"/>
@@ -7167,7 +7358,7 @@
                 <a:latin typeface="Arial" panose="020B0604020202020204" pitchFamily="34" charset="0"/>
                 <a:cs typeface="Arial" panose="020B0604020202020204" pitchFamily="34" charset="0"/>
               </a:rPr>
-              <a:t>Etape 1 : la carte des restaurants</a:t>
+              <a:t>Maquette</a:t>
             </a:r>
             <a:endParaRPr lang="en-US" sz="2000" b="1" dirty="0">
               <a:latin typeface="Arial" panose="020B0604020202020204" pitchFamily="34" charset="0"/>
@@ -7176,16 +7367,76 @@
           </a:p>
         </p:txBody>
       </p:sp>
-      <p:sp>
-        <p:nvSpPr>
-          <p:cNvPr id="6" name="TextBox 5"/>
+      <p:pic>
+        <p:nvPicPr>
+          <p:cNvPr id="2" name="Picture 1"/>
+          <p:cNvPicPr>
+            <a:picLocks noChangeAspect="1"/>
+          </p:cNvPicPr>
+          <p:nvPr/>
+        </p:nvPicPr>
+        <p:blipFill>
+          <a:blip r:embed="rId2" cstate="print">
+            <a:extLst>
+              <a:ext uri="{28A0092B-C50C-407E-A947-70E740481C1C}">
+                <a14:useLocalDpi xmlns:a14="http://schemas.microsoft.com/office/drawing/2010/main" val="0"/>
+              </a:ext>
+            </a:extLst>
+          </a:blip>
+          <a:stretch>
+            <a:fillRect/>
+          </a:stretch>
+        </p:blipFill>
+        <p:spPr>
+          <a:xfrm>
+            <a:off x="2271346" y="1210503"/>
+            <a:ext cx="2546838" cy="2464682"/>
+          </a:xfrm>
+          <a:prstGeom prst="rect">
+            <a:avLst/>
+          </a:prstGeom>
+        </p:spPr>
+      </p:pic>
+      <p:pic>
+        <p:nvPicPr>
+          <p:cNvPr id="3" name="Picture 2"/>
+          <p:cNvPicPr>
+            <a:picLocks noChangeAspect="1"/>
+          </p:cNvPicPr>
+          <p:nvPr/>
+        </p:nvPicPr>
+        <p:blipFill>
+          <a:blip r:embed="rId3" cstate="print">
+            <a:extLst>
+              <a:ext uri="{28A0092B-C50C-407E-A947-70E740481C1C}">
+                <a14:useLocalDpi xmlns:a14="http://schemas.microsoft.com/office/drawing/2010/main" val="0"/>
+              </a:ext>
+            </a:extLst>
+          </a:blip>
+          <a:stretch>
+            <a:fillRect/>
+          </a:stretch>
+        </p:blipFill>
+        <p:spPr>
+          <a:xfrm>
+            <a:off x="5104227" y="1210504"/>
+            <a:ext cx="1973581" cy="2466976"/>
+          </a:xfrm>
+          <a:prstGeom prst="rect">
+            <a:avLst/>
+          </a:prstGeom>
+        </p:spPr>
+      </p:pic>
+      <p:sp>
+        <p:nvSpPr>
+          <p:cNvPr id="4" name="TextBox 3"/>
           <p:cNvSpPr txBox="1"/>
           <p:nvPr/>
         </p:nvSpPr>
         <p:spPr>
           <a:xfrm>
-            <a:off x="2347546" y="1251439"/>
-            <a:ext cx="9469316" cy="4524315"/>
+            <a:off x="3140319" y="841171"/>
+            <a:ext cx="808892" cy="369332"/>
           </a:xfrm>
           <a:prstGeom prst="rect">
             <a:avLst/>
@@ -7198,24 +7449,199 @@
           </a:bodyPr>
           <a:lstStyle/>
           <a:p>
-            <a:pPr algn="just"/>
-            <a:r>
-              <a:rPr lang="fr-FR" b="1" dirty="0" smtClean="0">
-                <a:latin typeface="Arial" panose="020B0604020202020204" pitchFamily="34" charset="0"/>
-                <a:cs typeface="Arial" panose="020B0604020202020204" pitchFamily="34" charset="0"/>
-              </a:rPr>
-              <a:t>Objectifs :</a:t>
-            </a:r>
-          </a:p>
-          <a:p>
-            <a:pPr algn="just"/>
+            <a:r>
+              <a:rPr lang="fr-FR" dirty="0" smtClean="0">
+                <a:latin typeface="Arial" panose="020B0604020202020204" pitchFamily="34" charset="0"/>
+                <a:cs typeface="Arial" panose="020B0604020202020204" pitchFamily="34" charset="0"/>
+              </a:rPr>
+              <a:t>992px</a:t>
+            </a:r>
+            <a:endParaRPr lang="en-US" dirty="0">
+              <a:latin typeface="Arial" panose="020B0604020202020204" pitchFamily="34" charset="0"/>
+              <a:cs typeface="Arial" panose="020B0604020202020204" pitchFamily="34" charset="0"/>
+            </a:endParaRPr>
+          </a:p>
+        </p:txBody>
+      </p:sp>
+      <p:sp>
+        <p:nvSpPr>
+          <p:cNvPr id="7" name="TextBox 6"/>
+          <p:cNvSpPr txBox="1"/>
+          <p:nvPr/>
+        </p:nvSpPr>
+        <p:spPr>
+          <a:xfrm>
+            <a:off x="5686571" y="841171"/>
+            <a:ext cx="808892" cy="369332"/>
+          </a:xfrm>
+          <a:prstGeom prst="rect">
+            <a:avLst/>
+          </a:prstGeom>
+          <a:noFill/>
+        </p:spPr>
+        <p:txBody>
+          <a:bodyPr wrap="square" rtlCol="0">
+            <a:spAutoFit/>
+          </a:bodyPr>
+          <a:lstStyle/>
+          <a:p>
+            <a:r>
+              <a:rPr lang="fr-FR" dirty="0" smtClean="0">
+                <a:latin typeface="Arial" panose="020B0604020202020204" pitchFamily="34" charset="0"/>
+                <a:cs typeface="Arial" panose="020B0604020202020204" pitchFamily="34" charset="0"/>
+              </a:rPr>
+              <a:t>768px</a:t>
+            </a:r>
+            <a:endParaRPr lang="en-US" dirty="0">
+              <a:latin typeface="Arial" panose="020B0604020202020204" pitchFamily="34" charset="0"/>
+              <a:cs typeface="Arial" panose="020B0604020202020204" pitchFamily="34" charset="0"/>
+            </a:endParaRPr>
+          </a:p>
+        </p:txBody>
+      </p:sp>
+      <p:pic>
+        <p:nvPicPr>
+          <p:cNvPr id="8" name="Picture 7"/>
+          <p:cNvPicPr>
+            <a:picLocks noChangeAspect="1"/>
+          </p:cNvPicPr>
+          <p:nvPr/>
+        </p:nvPicPr>
+        <p:blipFill>
+          <a:blip r:embed="rId4" cstate="print">
+            <a:extLst>
+              <a:ext uri="{28A0092B-C50C-407E-A947-70E740481C1C}">
+                <a14:useLocalDpi xmlns:a14="http://schemas.microsoft.com/office/drawing/2010/main" val="0"/>
+              </a:ext>
+            </a:extLst>
+          </a:blip>
+          <a:stretch>
+            <a:fillRect/>
+          </a:stretch>
+        </p:blipFill>
+        <p:spPr>
+          <a:xfrm>
+            <a:off x="2271346" y="4237952"/>
+            <a:ext cx="2546838" cy="2037470"/>
+          </a:xfrm>
+          <a:prstGeom prst="rect">
+            <a:avLst/>
+          </a:prstGeom>
+        </p:spPr>
+      </p:pic>
+      <p:pic>
+        <p:nvPicPr>
+          <p:cNvPr id="9" name="Picture 8"/>
+          <p:cNvPicPr>
+            <a:picLocks noChangeAspect="1"/>
+          </p:cNvPicPr>
+          <p:nvPr/>
+        </p:nvPicPr>
+        <p:blipFill>
+          <a:blip r:embed="rId5" cstate="print">
+            <a:extLst>
+              <a:ext uri="{28A0092B-C50C-407E-A947-70E740481C1C}">
+                <a14:useLocalDpi xmlns:a14="http://schemas.microsoft.com/office/drawing/2010/main" val="0"/>
+              </a:ext>
+            </a:extLst>
+          </a:blip>
+          <a:stretch>
+            <a:fillRect/>
+          </a:stretch>
+        </p:blipFill>
+        <p:spPr>
+          <a:xfrm>
+            <a:off x="5104227" y="4237952"/>
+            <a:ext cx="2546837" cy="2037470"/>
+          </a:xfrm>
+          <a:prstGeom prst="rect">
+            <a:avLst/>
+          </a:prstGeom>
+        </p:spPr>
+      </p:pic>
+      <p:pic>
+        <p:nvPicPr>
+          <p:cNvPr id="10" name="Picture 9"/>
+          <p:cNvPicPr>
+            <a:picLocks noChangeAspect="1"/>
+          </p:cNvPicPr>
+          <p:nvPr/>
+        </p:nvPicPr>
+        <p:blipFill>
+          <a:blip r:embed="rId6" cstate="print">
+            <a:extLst>
+              <a:ext uri="{28A0092B-C50C-407E-A947-70E740481C1C}">
+                <a14:useLocalDpi xmlns:a14="http://schemas.microsoft.com/office/drawing/2010/main" val="0"/>
+              </a:ext>
+            </a:extLst>
+          </a:blip>
+          <a:stretch>
+            <a:fillRect/>
+          </a:stretch>
+        </p:blipFill>
+        <p:spPr>
+          <a:xfrm>
+            <a:off x="7937107" y="4237952"/>
+            <a:ext cx="2546838" cy="2037470"/>
+          </a:xfrm>
+          <a:prstGeom prst="rect">
+            <a:avLst/>
+          </a:prstGeom>
+        </p:spPr>
+      </p:pic>
+      <p:sp>
+        <p:nvSpPr>
+          <p:cNvPr id="11" name="TextBox 10"/>
+          <p:cNvSpPr txBox="1"/>
+          <p:nvPr/>
+        </p:nvSpPr>
+        <p:spPr>
+          <a:xfrm>
+            <a:off x="7990885" y="1210503"/>
+            <a:ext cx="2439282" cy="2308324"/>
+          </a:xfrm>
+          <a:prstGeom prst="rect">
+            <a:avLst/>
+          </a:prstGeom>
+          <a:noFill/>
+        </p:spPr>
+        <p:txBody>
+          <a:bodyPr wrap="square" rtlCol="0">
+            <a:spAutoFit/>
+          </a:bodyPr>
+          <a:lstStyle/>
+          <a:p>
+            <a:r>
+              <a:rPr lang="fr-FR" dirty="0" smtClean="0">
+                <a:latin typeface="Arial" panose="020B0604020202020204" pitchFamily="34" charset="0"/>
+                <a:cs typeface="Arial" panose="020B0604020202020204" pitchFamily="34" charset="0"/>
+              </a:rPr>
+              <a:t>Par résolution et</a:t>
+            </a:r>
+          </a:p>
+          <a:p>
+            <a:endParaRPr lang="fr-FR" dirty="0">
+              <a:latin typeface="Arial" panose="020B0604020202020204" pitchFamily="34" charset="0"/>
+              <a:cs typeface="Arial" panose="020B0604020202020204" pitchFamily="34" charset="0"/>
+            </a:endParaRPr>
+          </a:p>
+          <a:p>
+            <a:r>
+              <a:rPr lang="fr-FR" dirty="0" smtClean="0">
+                <a:latin typeface="Arial" panose="020B0604020202020204" pitchFamily="34" charset="0"/>
+                <a:cs typeface="Arial" panose="020B0604020202020204" pitchFamily="34" charset="0"/>
+              </a:rPr>
+              <a:t>Par composants ouverts :</a:t>
+            </a:r>
+          </a:p>
+          <a:p>
             <a:endParaRPr lang="fr-FR" dirty="0" smtClean="0">
               <a:latin typeface="Arial" panose="020B0604020202020204" pitchFamily="34" charset="0"/>
               <a:cs typeface="Arial" panose="020B0604020202020204" pitchFamily="34" charset="0"/>
             </a:endParaRPr>
           </a:p>
           <a:p>
-            <a:pPr marL="285750" indent="-285750" algn="just">
+            <a:pPr marL="285750" indent="-285750">
               <a:buFontTx/>
               <a:buChar char="-"/>
             </a:pPr>
@@ -7224,35 +7650,24 @@
                 <a:latin typeface="Arial" panose="020B0604020202020204" pitchFamily="34" charset="0"/>
                 <a:cs typeface="Arial" panose="020B0604020202020204" pitchFamily="34" charset="0"/>
               </a:rPr>
-              <a:t>Une carte Google </a:t>
-            </a:r>
-            <a:r>
-              <a:rPr lang="fr-FR" dirty="0" err="1" smtClean="0">
-                <a:latin typeface="Arial" panose="020B0604020202020204" pitchFamily="34" charset="0"/>
-                <a:cs typeface="Arial" panose="020B0604020202020204" pitchFamily="34" charset="0"/>
-              </a:rPr>
-              <a:t>Maps</a:t>
-            </a:r>
-            <a:r>
-              <a:rPr lang="fr-FR" dirty="0" smtClean="0">
-                <a:latin typeface="Arial" panose="020B0604020202020204" pitchFamily="34" charset="0"/>
-                <a:cs typeface="Arial" panose="020B0604020202020204" pitchFamily="34" charset="0"/>
-              </a:rPr>
-              <a:t> et une liste des restaurants correspondant à la zone affichée</a:t>
-            </a:r>
-          </a:p>
-          <a:p>
-            <a:pPr marL="285750" indent="-285750" algn="just">
+              <a:t>Ajouter restaurant</a:t>
+            </a:r>
+          </a:p>
+          <a:p>
+            <a:pPr marL="285750" indent="-285750">
               <a:buFontTx/>
               <a:buChar char="-"/>
             </a:pPr>
-            <a:endParaRPr lang="fr-FR" dirty="0" smtClean="0">
-              <a:latin typeface="Arial" panose="020B0604020202020204" pitchFamily="34" charset="0"/>
-              <a:cs typeface="Arial" panose="020B0604020202020204" pitchFamily="34" charset="0"/>
-            </a:endParaRPr>
-          </a:p>
-          <a:p>
-            <a:pPr marL="285750" indent="-285750" algn="just">
+            <a:r>
+              <a:rPr lang="fr-FR" dirty="0" smtClean="0">
+                <a:latin typeface="Arial" panose="020B0604020202020204" pitchFamily="34" charset="0"/>
+                <a:cs typeface="Arial" panose="020B0604020202020204" pitchFamily="34" charset="0"/>
+              </a:rPr>
+              <a:t>Ajouter avis</a:t>
+            </a:r>
+          </a:p>
+          <a:p>
+            <a:pPr marL="285750" indent="-285750">
               <a:buFontTx/>
               <a:buChar char="-"/>
             </a:pPr>
@@ -7261,133 +7676,7 @@
                 <a:latin typeface="Arial" panose="020B0604020202020204" pitchFamily="34" charset="0"/>
                 <a:cs typeface="Arial" panose="020B0604020202020204" pitchFamily="34" charset="0"/>
               </a:rPr>
-              <a:t>Ces deux éléments placés côte à côte. </a:t>
-            </a:r>
-          </a:p>
-          <a:p>
-            <a:pPr marL="285750" indent="-285750" algn="just">
-              <a:buFontTx/>
-              <a:buChar char="-"/>
-            </a:pPr>
-            <a:endParaRPr lang="fr-FR" dirty="0" smtClean="0">
-              <a:latin typeface="Arial" panose="020B0604020202020204" pitchFamily="34" charset="0"/>
-              <a:cs typeface="Arial" panose="020B0604020202020204" pitchFamily="34" charset="0"/>
-            </a:endParaRPr>
-          </a:p>
-          <a:p>
-            <a:pPr marL="285750" indent="-285750" algn="just">
-              <a:buFontTx/>
-              <a:buChar char="-"/>
-            </a:pPr>
-            <a:r>
-              <a:rPr lang="fr-FR" dirty="0" smtClean="0">
-                <a:latin typeface="Arial" panose="020B0604020202020204" pitchFamily="34" charset="0"/>
-                <a:cs typeface="Arial" panose="020B0604020202020204" pitchFamily="34" charset="0"/>
-              </a:rPr>
-              <a:t>Demande de géolocalisation avec centrage sur la position de l’utilisateur et marqueur spécifique</a:t>
-            </a:r>
-          </a:p>
-          <a:p>
-            <a:pPr marL="285750" indent="-285750" algn="just">
-              <a:buFontTx/>
-              <a:buChar char="-"/>
-            </a:pPr>
-            <a:endParaRPr lang="fr-FR" dirty="0" smtClean="0">
-              <a:latin typeface="Arial" panose="020B0604020202020204" pitchFamily="34" charset="0"/>
-              <a:cs typeface="Arial" panose="020B0604020202020204" pitchFamily="34" charset="0"/>
-            </a:endParaRPr>
-          </a:p>
-          <a:p>
-            <a:pPr marL="285750" indent="-285750" algn="just">
-              <a:buFontTx/>
-              <a:buChar char="-"/>
-            </a:pPr>
-            <a:r>
-              <a:rPr lang="fr-FR" dirty="0" smtClean="0">
-                <a:latin typeface="Arial" panose="020B0604020202020204" pitchFamily="34" charset="0"/>
-                <a:cs typeface="Arial" panose="020B0604020202020204" pitchFamily="34" charset="0"/>
-              </a:rPr>
-              <a:t>Une liste de restaurants chargée depuis un fichier JSON</a:t>
-            </a:r>
-          </a:p>
-          <a:p>
-            <a:pPr marL="285750" indent="-285750" algn="just">
-              <a:buFontTx/>
-              <a:buChar char="-"/>
-            </a:pPr>
-            <a:endParaRPr lang="fr-FR" dirty="0" smtClean="0">
-              <a:latin typeface="Arial" panose="020B0604020202020204" pitchFamily="34" charset="0"/>
-              <a:cs typeface="Arial" panose="020B0604020202020204" pitchFamily="34" charset="0"/>
-            </a:endParaRPr>
-          </a:p>
-          <a:p>
-            <a:pPr marL="285750" indent="-285750" algn="just">
-              <a:buFontTx/>
-              <a:buChar char="-"/>
-            </a:pPr>
-            <a:r>
-              <a:rPr lang="fr-FR" dirty="0" smtClean="0">
-                <a:latin typeface="Arial" panose="020B0604020202020204" pitchFamily="34" charset="0"/>
-                <a:cs typeface="Arial" panose="020B0604020202020204" pitchFamily="34" charset="0"/>
-              </a:rPr>
-              <a:t>Afficher dans la liste globale, la moyenne des avis reçus par chacun des restaurants</a:t>
-            </a:r>
-          </a:p>
-          <a:p>
-            <a:pPr marL="285750" indent="-285750" algn="just">
-              <a:buFontTx/>
-              <a:buChar char="-"/>
-            </a:pPr>
-            <a:endParaRPr lang="fr-FR" dirty="0" smtClean="0">
-              <a:latin typeface="Arial" panose="020B0604020202020204" pitchFamily="34" charset="0"/>
-              <a:cs typeface="Arial" panose="020B0604020202020204" pitchFamily="34" charset="0"/>
-            </a:endParaRPr>
-          </a:p>
-          <a:p>
-            <a:pPr marL="285750" indent="-285750" algn="just">
-              <a:buFontTx/>
-              <a:buChar char="-"/>
-            </a:pPr>
-            <a:r>
-              <a:rPr lang="fr-FR" dirty="0" smtClean="0">
-                <a:latin typeface="Arial" panose="020B0604020202020204" pitchFamily="34" charset="0"/>
-                <a:cs typeface="Arial" panose="020B0604020202020204" pitchFamily="34" charset="0"/>
-              </a:rPr>
-              <a:t>Au clique sur un restaurant, on peut lire les commentaires + photo Google Street </a:t>
-            </a:r>
-            <a:r>
-              <a:rPr lang="fr-FR" dirty="0" err="1" smtClean="0">
-                <a:latin typeface="Arial" panose="020B0604020202020204" pitchFamily="34" charset="0"/>
-                <a:cs typeface="Arial" panose="020B0604020202020204" pitchFamily="34" charset="0"/>
-              </a:rPr>
-              <a:t>View</a:t>
-            </a:r>
-            <a:endParaRPr lang="fr-FR" dirty="0" smtClean="0">
-              <a:latin typeface="Arial" panose="020B0604020202020204" pitchFamily="34" charset="0"/>
-              <a:cs typeface="Arial" panose="020B0604020202020204" pitchFamily="34" charset="0"/>
-            </a:endParaRPr>
-          </a:p>
-          <a:p>
-            <a:pPr marL="285750" indent="-285750" algn="just">
-              <a:buFontTx/>
-              <a:buChar char="-"/>
-            </a:pPr>
-            <a:endParaRPr lang="fr-FR" dirty="0" smtClean="0">
-              <a:latin typeface="Arial" panose="020B0604020202020204" pitchFamily="34" charset="0"/>
-              <a:cs typeface="Arial" panose="020B0604020202020204" pitchFamily="34" charset="0"/>
-            </a:endParaRPr>
-          </a:p>
-          <a:p>
-            <a:pPr marL="285750" indent="-285750" algn="just">
-              <a:buFontTx/>
-              <a:buChar char="-"/>
-            </a:pPr>
-            <a:r>
-              <a:rPr lang="fr-FR" dirty="0" smtClean="0">
-                <a:latin typeface="Arial" panose="020B0604020202020204" pitchFamily="34" charset="0"/>
-                <a:cs typeface="Arial" panose="020B0604020202020204" pitchFamily="34" charset="0"/>
-              </a:rPr>
-              <a:t>Possibilité de filtrer les restaurants en fonction de la moyenne des avis</a:t>
+              <a:t>Lire avis</a:t>
             </a:r>
             <a:endParaRPr lang="en-US" dirty="0">
               <a:latin typeface="Arial" panose="020B0604020202020204" pitchFamily="34" charset="0"/>
@@ -7399,7 +7688,7 @@
     </p:spTree>
     <p:extLst>
       <p:ext uri="{BB962C8B-B14F-4D97-AF65-F5344CB8AC3E}">
-        <p14:creationId xmlns:p14="http://schemas.microsoft.com/office/powerpoint/2010/main" val="265086280"/>
+        <p14:creationId xmlns:p14="http://schemas.microsoft.com/office/powerpoint/2010/main" val="2309896009"/>
       </p:ext>
     </p:extLst>
   </p:cSld>
@@ -7461,7 +7750,491 @@
                 <a:latin typeface="Arial" panose="020B0604020202020204" pitchFamily="34" charset="0"/>
                 <a:cs typeface="Arial" panose="020B0604020202020204" pitchFamily="34" charset="0"/>
               </a:rPr>
-              <a:t>Etape 1 : Organisation des composants</a:t>
+              <a:t>Architecture </a:t>
+            </a:r>
+            <a:r>
+              <a:rPr lang="fr-FR" sz="2000" b="1" dirty="0" smtClean="0">
+                <a:latin typeface="Arial" panose="020B0604020202020204" pitchFamily="34" charset="0"/>
+                <a:cs typeface="Arial" panose="020B0604020202020204" pitchFamily="34" charset="0"/>
+              </a:rPr>
+              <a:t>de l’application</a:t>
+            </a:r>
+            <a:endParaRPr lang="en-US" sz="2000" b="1" dirty="0">
+              <a:latin typeface="Arial" panose="020B0604020202020204" pitchFamily="34" charset="0"/>
+              <a:cs typeface="Arial" panose="020B0604020202020204" pitchFamily="34" charset="0"/>
+            </a:endParaRPr>
+          </a:p>
+        </p:txBody>
+      </p:sp>
+      <p:sp>
+        <p:nvSpPr>
+          <p:cNvPr id="23" name="TextBox 22"/>
+          <p:cNvSpPr txBox="1"/>
+          <p:nvPr/>
+        </p:nvSpPr>
+        <p:spPr>
+          <a:xfrm>
+            <a:off x="2347546" y="1251439"/>
+            <a:ext cx="9469316" cy="5632311"/>
+          </a:xfrm>
+          <a:prstGeom prst="rect">
+            <a:avLst/>
+          </a:prstGeom>
+          <a:noFill/>
+        </p:spPr>
+        <p:txBody>
+          <a:bodyPr wrap="square" rtlCol="0">
+            <a:spAutoFit/>
+          </a:bodyPr>
+          <a:lstStyle/>
+          <a:p>
+            <a:pPr marL="285750" indent="-285750" algn="just">
+              <a:buFontTx/>
+              <a:buChar char="-"/>
+            </a:pPr>
+            <a:r>
+              <a:rPr lang="fr-FR" dirty="0" smtClean="0">
+                <a:latin typeface="Arial" panose="020B0604020202020204" pitchFamily="34" charset="0"/>
+                <a:cs typeface="Arial" panose="020B0604020202020204" pitchFamily="34" charset="0"/>
+              </a:rPr>
+              <a:t>Séparation des composants en « </a:t>
+            </a:r>
+            <a:r>
+              <a:rPr lang="fr-FR" dirty="0" err="1" smtClean="0">
+                <a:latin typeface="Arial" panose="020B0604020202020204" pitchFamily="34" charset="0"/>
+                <a:cs typeface="Arial" panose="020B0604020202020204" pitchFamily="34" charset="0"/>
+              </a:rPr>
+              <a:t>core</a:t>
+            </a:r>
+            <a:r>
+              <a:rPr lang="fr-FR" dirty="0" smtClean="0">
+                <a:latin typeface="Arial" panose="020B0604020202020204" pitchFamily="34" charset="0"/>
+                <a:cs typeface="Arial" panose="020B0604020202020204" pitchFamily="34" charset="0"/>
+              </a:rPr>
+              <a:t>-components » et « </a:t>
+            </a:r>
+            <a:r>
+              <a:rPr lang="fr-FR" dirty="0" err="1" smtClean="0">
+                <a:latin typeface="Arial" panose="020B0604020202020204" pitchFamily="34" charset="0"/>
+                <a:cs typeface="Arial" panose="020B0604020202020204" pitchFamily="34" charset="0"/>
+              </a:rPr>
+              <a:t>side</a:t>
+            </a:r>
+            <a:r>
+              <a:rPr lang="fr-FR" dirty="0" smtClean="0">
+                <a:latin typeface="Arial" panose="020B0604020202020204" pitchFamily="34" charset="0"/>
+                <a:cs typeface="Arial" panose="020B0604020202020204" pitchFamily="34" charset="0"/>
+              </a:rPr>
+              <a:t>-components »</a:t>
+            </a:r>
+          </a:p>
+          <a:p>
+            <a:pPr marL="285750" indent="-285750" algn="just">
+              <a:buFontTx/>
+              <a:buChar char="-"/>
+            </a:pPr>
+            <a:endParaRPr lang="fr-FR" dirty="0">
+              <a:latin typeface="Arial" panose="020B0604020202020204" pitchFamily="34" charset="0"/>
+              <a:cs typeface="Arial" panose="020B0604020202020204" pitchFamily="34" charset="0"/>
+            </a:endParaRPr>
+          </a:p>
+          <a:p>
+            <a:pPr marL="285750" indent="-285750" algn="just">
+              <a:buFontTx/>
+              <a:buChar char="-"/>
+            </a:pPr>
+            <a:r>
+              <a:rPr lang="fr-FR" dirty="0" smtClean="0">
+                <a:latin typeface="Arial" panose="020B0604020202020204" pitchFamily="34" charset="0"/>
+                <a:cs typeface="Arial" panose="020B0604020202020204" pitchFamily="34" charset="0"/>
+              </a:rPr>
+              <a:t>Liste JSON dans le dossier « public », avec index.html</a:t>
+            </a:r>
+          </a:p>
+          <a:p>
+            <a:pPr marL="285750" indent="-285750" algn="just">
+              <a:buFontTx/>
+              <a:buChar char="-"/>
+            </a:pPr>
+            <a:endParaRPr lang="fr-FR" dirty="0">
+              <a:latin typeface="Arial" panose="020B0604020202020204" pitchFamily="34" charset="0"/>
+              <a:cs typeface="Arial" panose="020B0604020202020204" pitchFamily="34" charset="0"/>
+            </a:endParaRPr>
+          </a:p>
+          <a:p>
+            <a:pPr marL="285750" indent="-285750" algn="just">
+              <a:buFontTx/>
+              <a:buChar char="-"/>
+            </a:pPr>
+            <a:r>
+              <a:rPr lang="fr-FR" dirty="0" smtClean="0">
+                <a:latin typeface="Arial" panose="020B0604020202020204" pitchFamily="34" charset="0"/>
+                <a:cs typeface="Arial" panose="020B0604020202020204" pitchFamily="34" charset="0"/>
+              </a:rPr>
+              <a:t>Un fichier routes.js dans le dossier « </a:t>
+            </a:r>
+            <a:r>
+              <a:rPr lang="fr-FR" dirty="0" err="1" smtClean="0">
+                <a:latin typeface="Arial" panose="020B0604020202020204" pitchFamily="34" charset="0"/>
+                <a:cs typeface="Arial" panose="020B0604020202020204" pitchFamily="34" charset="0"/>
+              </a:rPr>
+              <a:t>src</a:t>
+            </a:r>
+            <a:r>
+              <a:rPr lang="fr-FR" dirty="0" smtClean="0">
+                <a:latin typeface="Arial" panose="020B0604020202020204" pitchFamily="34" charset="0"/>
+                <a:cs typeface="Arial" panose="020B0604020202020204" pitchFamily="34" charset="0"/>
+              </a:rPr>
+              <a:t> » pour Vue Router</a:t>
+            </a:r>
+          </a:p>
+          <a:p>
+            <a:pPr marL="285750" indent="-285750" algn="just">
+              <a:buFontTx/>
+              <a:buChar char="-"/>
+            </a:pPr>
+            <a:endParaRPr lang="fr-FR" dirty="0">
+              <a:latin typeface="Arial" panose="020B0604020202020204" pitchFamily="34" charset="0"/>
+              <a:cs typeface="Arial" panose="020B0604020202020204" pitchFamily="34" charset="0"/>
+            </a:endParaRPr>
+          </a:p>
+          <a:p>
+            <a:pPr marL="285750" indent="-285750" algn="just">
+              <a:buFontTx/>
+              <a:buChar char="-"/>
+            </a:pPr>
+            <a:r>
+              <a:rPr lang="fr-FR" dirty="0" smtClean="0">
+                <a:latin typeface="Arial" panose="020B0604020202020204" pitchFamily="34" charset="0"/>
+                <a:cs typeface="Arial" panose="020B0604020202020204" pitchFamily="34" charset="0"/>
+              </a:rPr>
+              <a:t>Un dossier « </a:t>
+            </a:r>
+            <a:r>
+              <a:rPr lang="fr-FR" dirty="0" err="1" smtClean="0">
+                <a:latin typeface="Arial" panose="020B0604020202020204" pitchFamily="34" charset="0"/>
+                <a:cs typeface="Arial" panose="020B0604020202020204" pitchFamily="34" charset="0"/>
+              </a:rPr>
+              <a:t>assets</a:t>
+            </a:r>
+            <a:r>
+              <a:rPr lang="fr-FR" dirty="0" smtClean="0">
+                <a:latin typeface="Arial" panose="020B0604020202020204" pitchFamily="34" charset="0"/>
+                <a:cs typeface="Arial" panose="020B0604020202020204" pitchFamily="34" charset="0"/>
+              </a:rPr>
+              <a:t> » contenant les images utilisées</a:t>
+            </a:r>
+          </a:p>
+          <a:p>
+            <a:pPr marL="285750" indent="-285750" algn="just">
+              <a:buFontTx/>
+              <a:buChar char="-"/>
+            </a:pPr>
+            <a:endParaRPr lang="fr-FR" dirty="0">
+              <a:latin typeface="Arial" panose="020B0604020202020204" pitchFamily="34" charset="0"/>
+              <a:cs typeface="Arial" panose="020B0604020202020204" pitchFamily="34" charset="0"/>
+            </a:endParaRPr>
+          </a:p>
+          <a:p>
+            <a:pPr marL="285750" indent="-285750" algn="just">
+              <a:buFontTx/>
+              <a:buChar char="-"/>
+            </a:pPr>
+            <a:r>
+              <a:rPr lang="fr-FR" dirty="0" smtClean="0">
+                <a:latin typeface="Arial" panose="020B0604020202020204" pitchFamily="34" charset="0"/>
+                <a:cs typeface="Arial" panose="020B0604020202020204" pitchFamily="34" charset="0"/>
+              </a:rPr>
+              <a:t>Un dossier « interfaces » avec un fichier restaurantfactory.js contenant l’appel </a:t>
+            </a:r>
+            <a:r>
+              <a:rPr lang="fr-FR" dirty="0" err="1" smtClean="0">
+                <a:latin typeface="Arial" panose="020B0604020202020204" pitchFamily="34" charset="0"/>
+                <a:cs typeface="Arial" panose="020B0604020202020204" pitchFamily="34" charset="0"/>
+              </a:rPr>
+              <a:t>Axios</a:t>
+            </a:r>
+            <a:r>
+              <a:rPr lang="fr-FR" dirty="0" smtClean="0">
+                <a:latin typeface="Arial" panose="020B0604020202020204" pitchFamily="34" charset="0"/>
+                <a:cs typeface="Arial" panose="020B0604020202020204" pitchFamily="34" charset="0"/>
+              </a:rPr>
+              <a:t> à la liste JSON + </a:t>
+            </a:r>
+            <a:r>
+              <a:rPr lang="fr-FR" dirty="0" err="1" smtClean="0">
+                <a:latin typeface="Arial" panose="020B0604020202020204" pitchFamily="34" charset="0"/>
+                <a:cs typeface="Arial" panose="020B0604020202020204" pitchFamily="34" charset="0"/>
+              </a:rPr>
+              <a:t>GooglePlaces</a:t>
+            </a:r>
+            <a:r>
+              <a:rPr lang="fr-FR" dirty="0" smtClean="0">
+                <a:latin typeface="Arial" panose="020B0604020202020204" pitchFamily="34" charset="0"/>
+                <a:cs typeface="Arial" panose="020B0604020202020204" pitchFamily="34" charset="0"/>
+              </a:rPr>
+              <a:t>. Importé dans le Store</a:t>
+            </a:r>
+          </a:p>
+          <a:p>
+            <a:pPr algn="just"/>
+            <a:r>
+              <a:rPr lang="fr-FR" dirty="0" smtClean="0">
+                <a:latin typeface="Arial" panose="020B0604020202020204" pitchFamily="34" charset="0"/>
+                <a:cs typeface="Arial" panose="020B0604020202020204" pitchFamily="34" charset="0"/>
+              </a:rPr>
+              <a:t>Pour dissocier l’API du projet, et être en mesure de changer d’API</a:t>
+            </a:r>
+          </a:p>
+          <a:p>
+            <a:pPr algn="just"/>
+            <a:r>
+              <a:rPr lang="fr-FR" dirty="0" smtClean="0">
+                <a:latin typeface="Arial" panose="020B0604020202020204" pitchFamily="34" charset="0"/>
+                <a:cs typeface="Arial" panose="020B0604020202020204" pitchFamily="34" charset="0"/>
+              </a:rPr>
+              <a:t>Même logique pour Google, </a:t>
+            </a:r>
+            <a:r>
+              <a:rPr lang="fr-FR" dirty="0" err="1" smtClean="0">
+                <a:latin typeface="Arial" panose="020B0604020202020204" pitchFamily="34" charset="0"/>
+                <a:cs typeface="Arial" panose="020B0604020202020204" pitchFamily="34" charset="0"/>
+              </a:rPr>
+              <a:t>MainMap</a:t>
+            </a:r>
+            <a:r>
+              <a:rPr lang="fr-FR" dirty="0" smtClean="0">
+                <a:latin typeface="Arial" panose="020B0604020202020204" pitchFamily="34" charset="0"/>
+                <a:cs typeface="Arial" panose="020B0604020202020204" pitchFamily="34" charset="0"/>
+              </a:rPr>
+              <a:t> important </a:t>
+            </a:r>
+            <a:r>
+              <a:rPr lang="fr-FR" dirty="0" err="1" smtClean="0">
+                <a:latin typeface="Arial" panose="020B0604020202020204" pitchFamily="34" charset="0"/>
+                <a:cs typeface="Arial" panose="020B0604020202020204" pitchFamily="34" charset="0"/>
+              </a:rPr>
+              <a:t>GoogleMap</a:t>
+            </a:r>
+            <a:r>
+              <a:rPr lang="fr-FR" dirty="0" smtClean="0">
+                <a:latin typeface="Arial" panose="020B0604020202020204" pitchFamily="34" charset="0"/>
+                <a:cs typeface="Arial" panose="020B0604020202020204" pitchFamily="34" charset="0"/>
+              </a:rPr>
+              <a:t> et </a:t>
+            </a:r>
+            <a:r>
+              <a:rPr lang="fr-FR" dirty="0" err="1" smtClean="0">
+                <a:latin typeface="Arial" panose="020B0604020202020204" pitchFamily="34" charset="0"/>
+                <a:cs typeface="Arial" panose="020B0604020202020204" pitchFamily="34" charset="0"/>
+              </a:rPr>
+              <a:t>GoogleMarkers</a:t>
+            </a:r>
+            <a:endParaRPr lang="fr-FR" dirty="0" smtClean="0">
+              <a:latin typeface="Arial" panose="020B0604020202020204" pitchFamily="34" charset="0"/>
+              <a:cs typeface="Arial" panose="020B0604020202020204" pitchFamily="34" charset="0"/>
+            </a:endParaRPr>
+          </a:p>
+          <a:p>
+            <a:pPr marL="285750" indent="-285750" algn="just">
+              <a:buFontTx/>
+              <a:buChar char="-"/>
+            </a:pPr>
+            <a:endParaRPr lang="fr-FR" dirty="0">
+              <a:latin typeface="Arial" panose="020B0604020202020204" pitchFamily="34" charset="0"/>
+              <a:cs typeface="Arial" panose="020B0604020202020204" pitchFamily="34" charset="0"/>
+            </a:endParaRPr>
+          </a:p>
+          <a:p>
+            <a:pPr marL="285750" indent="-285750" algn="just">
+              <a:buFontTx/>
+              <a:buChar char="-"/>
+            </a:pPr>
+            <a:r>
+              <a:rPr lang="fr-FR" dirty="0" smtClean="0">
+                <a:latin typeface="Arial" panose="020B0604020202020204" pitchFamily="34" charset="0"/>
+                <a:cs typeface="Arial" panose="020B0604020202020204" pitchFamily="34" charset="0"/>
+              </a:rPr>
+              <a:t>Un dossier « store » contenant le Store : </a:t>
+            </a:r>
+            <a:r>
+              <a:rPr lang="fr-FR" dirty="0" err="1" smtClean="0">
+                <a:latin typeface="Arial" panose="020B0604020202020204" pitchFamily="34" charset="0"/>
+                <a:cs typeface="Arial" panose="020B0604020202020204" pitchFamily="34" charset="0"/>
+              </a:rPr>
+              <a:t>Vuex</a:t>
+            </a:r>
+            <a:endParaRPr lang="fr-FR" dirty="0" smtClean="0">
+              <a:latin typeface="Arial" panose="020B0604020202020204" pitchFamily="34" charset="0"/>
+              <a:cs typeface="Arial" panose="020B0604020202020204" pitchFamily="34" charset="0"/>
+            </a:endParaRPr>
+          </a:p>
+          <a:p>
+            <a:pPr marL="285750" indent="-285750" algn="just">
+              <a:buFontTx/>
+              <a:buChar char="-"/>
+            </a:pPr>
+            <a:endParaRPr lang="fr-FR" dirty="0">
+              <a:latin typeface="Arial" panose="020B0604020202020204" pitchFamily="34" charset="0"/>
+              <a:cs typeface="Arial" panose="020B0604020202020204" pitchFamily="34" charset="0"/>
+            </a:endParaRPr>
+          </a:p>
+          <a:p>
+            <a:pPr marL="285750" indent="-285750" algn="just">
+              <a:buFontTx/>
+              <a:buChar char="-"/>
+            </a:pPr>
+            <a:r>
+              <a:rPr lang="fr-FR" dirty="0" smtClean="0">
+                <a:latin typeface="Arial" panose="020B0604020202020204" pitchFamily="34" charset="0"/>
+                <a:cs typeface="Arial" panose="020B0604020202020204" pitchFamily="34" charset="0"/>
+              </a:rPr>
+              <a:t>CSS Responsive (</a:t>
+            </a:r>
+            <a:r>
+              <a:rPr lang="fr-FR" dirty="0" err="1" smtClean="0">
+                <a:latin typeface="Arial" panose="020B0604020202020204" pitchFamily="34" charset="0"/>
+                <a:cs typeface="Arial" panose="020B0604020202020204" pitchFamily="34" charset="0"/>
+              </a:rPr>
+              <a:t>Bootstrap</a:t>
+            </a:r>
+            <a:r>
+              <a:rPr lang="fr-FR" dirty="0" smtClean="0">
+                <a:latin typeface="Arial" panose="020B0604020202020204" pitchFamily="34" charset="0"/>
+                <a:cs typeface="Arial" panose="020B0604020202020204" pitchFamily="34" charset="0"/>
+              </a:rPr>
+              <a:t> 4 </a:t>
+            </a:r>
+            <a:r>
+              <a:rPr lang="fr-FR" dirty="0" err="1" smtClean="0">
+                <a:latin typeface="Arial" panose="020B0604020202020204" pitchFamily="34" charset="0"/>
+                <a:cs typeface="Arial" panose="020B0604020202020204" pitchFamily="34" charset="0"/>
+              </a:rPr>
+              <a:t>breakpoints</a:t>
+            </a:r>
+            <a:r>
+              <a:rPr lang="fr-FR" dirty="0" smtClean="0">
+                <a:latin typeface="Arial" panose="020B0604020202020204" pitchFamily="34" charset="0"/>
+                <a:cs typeface="Arial" panose="020B0604020202020204" pitchFamily="34" charset="0"/>
+              </a:rPr>
+              <a:t>)</a:t>
+            </a:r>
+          </a:p>
+          <a:p>
+            <a:pPr marL="285750" indent="-285750" algn="just">
+              <a:buFontTx/>
+              <a:buChar char="-"/>
+            </a:pPr>
+            <a:endParaRPr lang="fr-FR" dirty="0">
+              <a:latin typeface="Arial" panose="020B0604020202020204" pitchFamily="34" charset="0"/>
+              <a:cs typeface="Arial" panose="020B0604020202020204" pitchFamily="34" charset="0"/>
+            </a:endParaRPr>
+          </a:p>
+          <a:p>
+            <a:pPr marL="285750" indent="-285750" algn="just">
+              <a:buFontTx/>
+              <a:buChar char="-"/>
+            </a:pPr>
+            <a:endParaRPr lang="fr-FR" dirty="0" smtClean="0">
+              <a:latin typeface="Arial" panose="020B0604020202020204" pitchFamily="34" charset="0"/>
+              <a:cs typeface="Arial" panose="020B0604020202020204" pitchFamily="34" charset="0"/>
+            </a:endParaRPr>
+          </a:p>
+          <a:p>
+            <a:pPr marL="285750" indent="-285750" algn="just">
+              <a:buFontTx/>
+              <a:buChar char="-"/>
+            </a:pPr>
+            <a:endParaRPr lang="fr-FR" dirty="0">
+              <a:latin typeface="Arial" panose="020B0604020202020204" pitchFamily="34" charset="0"/>
+              <a:cs typeface="Arial" panose="020B0604020202020204" pitchFamily="34" charset="0"/>
+            </a:endParaRPr>
+          </a:p>
+          <a:p>
+            <a:pPr marL="285750" indent="-285750" algn="just">
+              <a:buFontTx/>
+              <a:buChar char="-"/>
+            </a:pPr>
+            <a:endParaRPr lang="en-US" dirty="0">
+              <a:latin typeface="Arial" panose="020B0604020202020204" pitchFamily="34" charset="0"/>
+              <a:cs typeface="Arial" panose="020B0604020202020204" pitchFamily="34" charset="0"/>
+            </a:endParaRPr>
+          </a:p>
+        </p:txBody>
+      </p:sp>
+    </p:spTree>
+    <p:extLst>
+      <p:ext uri="{BB962C8B-B14F-4D97-AF65-F5344CB8AC3E}">
+        <p14:creationId xmlns:p14="http://schemas.microsoft.com/office/powerpoint/2010/main" val="1803882588"/>
+      </p:ext>
+    </p:extLst>
+  </p:cSld>
+  <p:clrMapOvr>
+    <a:masterClrMapping/>
+  </p:clrMapOvr>
+  <p:timing>
+    <p:tnLst>
+      <p:par>
+        <p:cTn id="1" dur="indefinite" restart="never" nodeType="tmRoot"/>
+      </p:par>
+    </p:tnLst>
+  </p:timing>
+</p:sld>
+</file>
+
+<file path=ppt/slides/slide5.xml><?xml version="1.0" encoding="utf-8"?>
+<p:sld xmlns:a="http://schemas.openxmlformats.org/drawingml/2006/main" xmlns:r="http://schemas.openxmlformats.org/officeDocument/2006/relationships" xmlns:p="http://schemas.openxmlformats.org/presentationml/2006/main">
+  <p:cSld>
+    <p:spTree>
+      <p:nvGrpSpPr>
+        <p:cNvPr id="1" name=""/>
+        <p:cNvGrpSpPr/>
+        <p:nvPr/>
+      </p:nvGrpSpPr>
+      <p:grpSpPr>
+        <a:xfrm>
+          <a:off x="0" y="0"/>
+          <a:ext cx="0" cy="0"/>
+          <a:chOff x="0" y="0"/>
+          <a:chExt cx="0" cy="0"/>
+        </a:xfrm>
+      </p:grpSpPr>
+      <p:sp>
+        <p:nvSpPr>
+          <p:cNvPr id="5" name="TextBox 4"/>
+          <p:cNvSpPr txBox="1"/>
+          <p:nvPr/>
+        </p:nvSpPr>
+        <p:spPr>
+          <a:xfrm>
+            <a:off x="2347546" y="334108"/>
+            <a:ext cx="9469316" cy="400110"/>
+          </a:xfrm>
+          <a:prstGeom prst="rect">
+            <a:avLst/>
+          </a:prstGeom>
+          <a:noFill/>
+        </p:spPr>
+        <p:txBody>
+          <a:bodyPr wrap="square" rtlCol="0">
+            <a:spAutoFit/>
+          </a:bodyPr>
+          <a:lstStyle/>
+          <a:p>
+            <a:pPr algn="just"/>
+            <a:r>
+              <a:rPr lang="fr-FR" sz="2000" b="1" dirty="0" smtClean="0">
+                <a:latin typeface="Arial" panose="020B0604020202020204" pitchFamily="34" charset="0"/>
+                <a:cs typeface="Arial" panose="020B0604020202020204" pitchFamily="34" charset="0"/>
+              </a:rPr>
+              <a:t>Organisation </a:t>
+            </a:r>
+            <a:r>
+              <a:rPr lang="fr-FR" sz="2000" b="1" dirty="0" smtClean="0">
+                <a:latin typeface="Arial" panose="020B0604020202020204" pitchFamily="34" charset="0"/>
+                <a:cs typeface="Arial" panose="020B0604020202020204" pitchFamily="34" charset="0"/>
+              </a:rPr>
+              <a:t>des composants</a:t>
             </a:r>
             <a:endParaRPr lang="en-US" sz="2000" b="1" dirty="0">
               <a:latin typeface="Arial" panose="020B0604020202020204" pitchFamily="34" charset="0"/>
@@ -7760,14 +8533,7 @@
                 <a:latin typeface="Arial" panose="020B0604020202020204" pitchFamily="34" charset="0"/>
                 <a:cs typeface="Arial" panose="020B0604020202020204" pitchFamily="34" charset="0"/>
               </a:rPr>
-              <a:t>Header : titre + réseaux </a:t>
-            </a:r>
-            <a:r>
-              <a:rPr lang="fr-FR" sz="1200" dirty="0" smtClean="0">
-                <a:latin typeface="Arial" panose="020B0604020202020204" pitchFamily="34" charset="0"/>
-                <a:cs typeface="Arial" panose="020B0604020202020204" pitchFamily="34" charset="0"/>
-              </a:rPr>
-              <a:t>sociaux et stores</a:t>
+              <a:t>Header : titre + réseaux sociaux et stores</a:t>
             </a:r>
             <a:endParaRPr lang="en-US" sz="1200" dirty="0">
               <a:latin typeface="Arial" panose="020B0604020202020204" pitchFamily="34" charset="0"/>
@@ -8308,490 +9074,6 @@
 </p:sld>
 </file>
 
-<file path=ppt/slides/slide5.xml><?xml version="1.0" encoding="utf-8"?>
-<p:sld xmlns:a="http://schemas.openxmlformats.org/drawingml/2006/main" xmlns:r="http://schemas.openxmlformats.org/officeDocument/2006/relationships" xmlns:p="http://schemas.openxmlformats.org/presentationml/2006/main">
-  <p:cSld>
-    <p:spTree>
-      <p:nvGrpSpPr>
-        <p:cNvPr id="1" name=""/>
-        <p:cNvGrpSpPr/>
-        <p:nvPr/>
-      </p:nvGrpSpPr>
-      <p:grpSpPr>
-        <a:xfrm>
-          <a:off x="0" y="0"/>
-          <a:ext cx="0" cy="0"/>
-          <a:chOff x="0" y="0"/>
-          <a:chExt cx="0" cy="0"/>
-        </a:xfrm>
-      </p:grpSpPr>
-      <p:sp>
-        <p:nvSpPr>
-          <p:cNvPr id="5" name="TextBox 4"/>
-          <p:cNvSpPr txBox="1"/>
-          <p:nvPr/>
-        </p:nvSpPr>
-        <p:spPr>
-          <a:xfrm>
-            <a:off x="2347546" y="334108"/>
-            <a:ext cx="9469316" cy="400110"/>
-          </a:xfrm>
-          <a:prstGeom prst="rect">
-            <a:avLst/>
-          </a:prstGeom>
-          <a:noFill/>
-        </p:spPr>
-        <p:txBody>
-          <a:bodyPr wrap="square" rtlCol="0">
-            <a:spAutoFit/>
-          </a:bodyPr>
-          <a:lstStyle/>
-          <a:p>
-            <a:pPr algn="just"/>
-            <a:r>
-              <a:rPr lang="fr-FR" sz="2000" b="1" dirty="0" smtClean="0">
-                <a:latin typeface="Arial" panose="020B0604020202020204" pitchFamily="34" charset="0"/>
-                <a:cs typeface="Arial" panose="020B0604020202020204" pitchFamily="34" charset="0"/>
-              </a:rPr>
-              <a:t>Etape 1 : Architecture de l’application</a:t>
-            </a:r>
-            <a:endParaRPr lang="en-US" sz="2000" b="1" dirty="0">
-              <a:latin typeface="Arial" panose="020B0604020202020204" pitchFamily="34" charset="0"/>
-              <a:cs typeface="Arial" panose="020B0604020202020204" pitchFamily="34" charset="0"/>
-            </a:endParaRPr>
-          </a:p>
-        </p:txBody>
-      </p:sp>
-      <p:sp>
-        <p:nvSpPr>
-          <p:cNvPr id="23" name="TextBox 22"/>
-          <p:cNvSpPr txBox="1"/>
-          <p:nvPr/>
-        </p:nvSpPr>
-        <p:spPr>
-          <a:xfrm>
-            <a:off x="2347546" y="1251439"/>
-            <a:ext cx="9469316" cy="5632311"/>
-          </a:xfrm>
-          <a:prstGeom prst="rect">
-            <a:avLst/>
-          </a:prstGeom>
-          <a:noFill/>
-        </p:spPr>
-        <p:txBody>
-          <a:bodyPr wrap="square" rtlCol="0">
-            <a:spAutoFit/>
-          </a:bodyPr>
-          <a:lstStyle/>
-          <a:p>
-            <a:pPr marL="285750" indent="-285750" algn="just">
-              <a:buFontTx/>
-              <a:buChar char="-"/>
-            </a:pPr>
-            <a:r>
-              <a:rPr lang="fr-FR" dirty="0" smtClean="0">
-                <a:latin typeface="Arial" panose="020B0604020202020204" pitchFamily="34" charset="0"/>
-                <a:cs typeface="Arial" panose="020B0604020202020204" pitchFamily="34" charset="0"/>
-              </a:rPr>
-              <a:t>Séparation des composants en « </a:t>
-            </a:r>
-            <a:r>
-              <a:rPr lang="fr-FR" dirty="0" err="1" smtClean="0">
-                <a:latin typeface="Arial" panose="020B0604020202020204" pitchFamily="34" charset="0"/>
-                <a:cs typeface="Arial" panose="020B0604020202020204" pitchFamily="34" charset="0"/>
-              </a:rPr>
-              <a:t>core</a:t>
-            </a:r>
-            <a:r>
-              <a:rPr lang="fr-FR" dirty="0" smtClean="0">
-                <a:latin typeface="Arial" panose="020B0604020202020204" pitchFamily="34" charset="0"/>
-                <a:cs typeface="Arial" panose="020B0604020202020204" pitchFamily="34" charset="0"/>
-              </a:rPr>
-              <a:t>-components » et « </a:t>
-            </a:r>
-            <a:r>
-              <a:rPr lang="fr-FR" dirty="0" err="1" smtClean="0">
-                <a:latin typeface="Arial" panose="020B0604020202020204" pitchFamily="34" charset="0"/>
-                <a:cs typeface="Arial" panose="020B0604020202020204" pitchFamily="34" charset="0"/>
-              </a:rPr>
-              <a:t>side</a:t>
-            </a:r>
-            <a:r>
-              <a:rPr lang="fr-FR" dirty="0" smtClean="0">
-                <a:latin typeface="Arial" panose="020B0604020202020204" pitchFamily="34" charset="0"/>
-                <a:cs typeface="Arial" panose="020B0604020202020204" pitchFamily="34" charset="0"/>
-              </a:rPr>
-              <a:t>-components »</a:t>
-            </a:r>
-          </a:p>
-          <a:p>
-            <a:pPr marL="285750" indent="-285750" algn="just">
-              <a:buFontTx/>
-              <a:buChar char="-"/>
-            </a:pPr>
-            <a:endParaRPr lang="fr-FR" dirty="0">
-              <a:latin typeface="Arial" panose="020B0604020202020204" pitchFamily="34" charset="0"/>
-              <a:cs typeface="Arial" panose="020B0604020202020204" pitchFamily="34" charset="0"/>
-            </a:endParaRPr>
-          </a:p>
-          <a:p>
-            <a:pPr marL="285750" indent="-285750" algn="just">
-              <a:buFontTx/>
-              <a:buChar char="-"/>
-            </a:pPr>
-            <a:r>
-              <a:rPr lang="fr-FR" dirty="0" smtClean="0">
-                <a:latin typeface="Arial" panose="020B0604020202020204" pitchFamily="34" charset="0"/>
-                <a:cs typeface="Arial" panose="020B0604020202020204" pitchFamily="34" charset="0"/>
-              </a:rPr>
-              <a:t>Liste JSON dans le dossier « public », avec index.html</a:t>
-            </a:r>
-          </a:p>
-          <a:p>
-            <a:pPr marL="285750" indent="-285750" algn="just">
-              <a:buFontTx/>
-              <a:buChar char="-"/>
-            </a:pPr>
-            <a:endParaRPr lang="fr-FR" dirty="0">
-              <a:latin typeface="Arial" panose="020B0604020202020204" pitchFamily="34" charset="0"/>
-              <a:cs typeface="Arial" panose="020B0604020202020204" pitchFamily="34" charset="0"/>
-            </a:endParaRPr>
-          </a:p>
-          <a:p>
-            <a:pPr marL="285750" indent="-285750" algn="just">
-              <a:buFontTx/>
-              <a:buChar char="-"/>
-            </a:pPr>
-            <a:r>
-              <a:rPr lang="fr-FR" dirty="0" smtClean="0">
-                <a:latin typeface="Arial" panose="020B0604020202020204" pitchFamily="34" charset="0"/>
-                <a:cs typeface="Arial" panose="020B0604020202020204" pitchFamily="34" charset="0"/>
-              </a:rPr>
-              <a:t>Un fichier routes.js dans le dossier « </a:t>
-            </a:r>
-            <a:r>
-              <a:rPr lang="fr-FR" dirty="0" err="1" smtClean="0">
-                <a:latin typeface="Arial" panose="020B0604020202020204" pitchFamily="34" charset="0"/>
-                <a:cs typeface="Arial" panose="020B0604020202020204" pitchFamily="34" charset="0"/>
-              </a:rPr>
-              <a:t>src</a:t>
-            </a:r>
-            <a:r>
-              <a:rPr lang="fr-FR" dirty="0" smtClean="0">
-                <a:latin typeface="Arial" panose="020B0604020202020204" pitchFamily="34" charset="0"/>
-                <a:cs typeface="Arial" panose="020B0604020202020204" pitchFamily="34" charset="0"/>
-              </a:rPr>
-              <a:t> » pour Vue Router</a:t>
-            </a:r>
-          </a:p>
-          <a:p>
-            <a:pPr marL="285750" indent="-285750" algn="just">
-              <a:buFontTx/>
-              <a:buChar char="-"/>
-            </a:pPr>
-            <a:endParaRPr lang="fr-FR" dirty="0">
-              <a:latin typeface="Arial" panose="020B0604020202020204" pitchFamily="34" charset="0"/>
-              <a:cs typeface="Arial" panose="020B0604020202020204" pitchFamily="34" charset="0"/>
-            </a:endParaRPr>
-          </a:p>
-          <a:p>
-            <a:pPr marL="285750" indent="-285750" algn="just">
-              <a:buFontTx/>
-              <a:buChar char="-"/>
-            </a:pPr>
-            <a:r>
-              <a:rPr lang="fr-FR" dirty="0" smtClean="0">
-                <a:latin typeface="Arial" panose="020B0604020202020204" pitchFamily="34" charset="0"/>
-                <a:cs typeface="Arial" panose="020B0604020202020204" pitchFamily="34" charset="0"/>
-              </a:rPr>
-              <a:t>Un dossier « </a:t>
-            </a:r>
-            <a:r>
-              <a:rPr lang="fr-FR" dirty="0" err="1" smtClean="0">
-                <a:latin typeface="Arial" panose="020B0604020202020204" pitchFamily="34" charset="0"/>
-                <a:cs typeface="Arial" panose="020B0604020202020204" pitchFamily="34" charset="0"/>
-              </a:rPr>
-              <a:t>assets</a:t>
-            </a:r>
-            <a:r>
-              <a:rPr lang="fr-FR" dirty="0" smtClean="0">
-                <a:latin typeface="Arial" panose="020B0604020202020204" pitchFamily="34" charset="0"/>
-                <a:cs typeface="Arial" panose="020B0604020202020204" pitchFamily="34" charset="0"/>
-              </a:rPr>
-              <a:t> » contenant les images utilisées</a:t>
-            </a:r>
-          </a:p>
-          <a:p>
-            <a:pPr marL="285750" indent="-285750" algn="just">
-              <a:buFontTx/>
-              <a:buChar char="-"/>
-            </a:pPr>
-            <a:endParaRPr lang="fr-FR" dirty="0">
-              <a:latin typeface="Arial" panose="020B0604020202020204" pitchFamily="34" charset="0"/>
-              <a:cs typeface="Arial" panose="020B0604020202020204" pitchFamily="34" charset="0"/>
-            </a:endParaRPr>
-          </a:p>
-          <a:p>
-            <a:pPr marL="285750" indent="-285750" algn="just">
-              <a:buFontTx/>
-              <a:buChar char="-"/>
-            </a:pPr>
-            <a:r>
-              <a:rPr lang="fr-FR" dirty="0" smtClean="0">
-                <a:latin typeface="Arial" panose="020B0604020202020204" pitchFamily="34" charset="0"/>
-                <a:cs typeface="Arial" panose="020B0604020202020204" pitchFamily="34" charset="0"/>
-              </a:rPr>
-              <a:t>Un dossier « interfaces » avec un fichier restaurantfactory.js contenant l’appel </a:t>
-            </a:r>
-            <a:r>
-              <a:rPr lang="fr-FR" dirty="0" err="1" smtClean="0">
-                <a:latin typeface="Arial" panose="020B0604020202020204" pitchFamily="34" charset="0"/>
-                <a:cs typeface="Arial" panose="020B0604020202020204" pitchFamily="34" charset="0"/>
-              </a:rPr>
-              <a:t>Axios</a:t>
-            </a:r>
-            <a:r>
-              <a:rPr lang="fr-FR" dirty="0" smtClean="0">
-                <a:latin typeface="Arial" panose="020B0604020202020204" pitchFamily="34" charset="0"/>
-                <a:cs typeface="Arial" panose="020B0604020202020204" pitchFamily="34" charset="0"/>
-              </a:rPr>
-              <a:t> à la liste </a:t>
-            </a:r>
-            <a:r>
-              <a:rPr lang="fr-FR" dirty="0" smtClean="0">
-                <a:latin typeface="Arial" panose="020B0604020202020204" pitchFamily="34" charset="0"/>
-                <a:cs typeface="Arial" panose="020B0604020202020204" pitchFamily="34" charset="0"/>
-              </a:rPr>
-              <a:t>JSON + </a:t>
-            </a:r>
-            <a:r>
-              <a:rPr lang="fr-FR" dirty="0" err="1" smtClean="0">
-                <a:latin typeface="Arial" panose="020B0604020202020204" pitchFamily="34" charset="0"/>
-                <a:cs typeface="Arial" panose="020B0604020202020204" pitchFamily="34" charset="0"/>
-              </a:rPr>
-              <a:t>GooglePlaces</a:t>
-            </a:r>
-            <a:r>
-              <a:rPr lang="fr-FR" dirty="0" smtClean="0">
-                <a:latin typeface="Arial" panose="020B0604020202020204" pitchFamily="34" charset="0"/>
-                <a:cs typeface="Arial" panose="020B0604020202020204" pitchFamily="34" charset="0"/>
-              </a:rPr>
-              <a:t>. </a:t>
-            </a:r>
-            <a:r>
-              <a:rPr lang="fr-FR" dirty="0" smtClean="0">
-                <a:latin typeface="Arial" panose="020B0604020202020204" pitchFamily="34" charset="0"/>
-                <a:cs typeface="Arial" panose="020B0604020202020204" pitchFamily="34" charset="0"/>
-              </a:rPr>
-              <a:t>Importé dans le Store</a:t>
-            </a:r>
-          </a:p>
-          <a:p>
-            <a:pPr algn="just"/>
-            <a:r>
-              <a:rPr lang="fr-FR" dirty="0" smtClean="0">
-                <a:latin typeface="Arial" panose="020B0604020202020204" pitchFamily="34" charset="0"/>
-                <a:cs typeface="Arial" panose="020B0604020202020204" pitchFamily="34" charset="0"/>
-              </a:rPr>
-              <a:t>Pour dissocier l’API du projet, et être en mesure de changer d’API</a:t>
-            </a:r>
-          </a:p>
-          <a:p>
-            <a:pPr algn="just"/>
-            <a:r>
-              <a:rPr lang="fr-FR" dirty="0" smtClean="0">
-                <a:latin typeface="Arial" panose="020B0604020202020204" pitchFamily="34" charset="0"/>
-                <a:cs typeface="Arial" panose="020B0604020202020204" pitchFamily="34" charset="0"/>
-              </a:rPr>
-              <a:t>Même logique pour Google, </a:t>
-            </a:r>
-            <a:r>
-              <a:rPr lang="fr-FR" dirty="0" err="1" smtClean="0">
-                <a:latin typeface="Arial" panose="020B0604020202020204" pitchFamily="34" charset="0"/>
-                <a:cs typeface="Arial" panose="020B0604020202020204" pitchFamily="34" charset="0"/>
-              </a:rPr>
-              <a:t>MainMap</a:t>
-            </a:r>
-            <a:r>
-              <a:rPr lang="fr-FR" dirty="0" smtClean="0">
-                <a:latin typeface="Arial" panose="020B0604020202020204" pitchFamily="34" charset="0"/>
-                <a:cs typeface="Arial" panose="020B0604020202020204" pitchFamily="34" charset="0"/>
-              </a:rPr>
-              <a:t> important </a:t>
-            </a:r>
-            <a:r>
-              <a:rPr lang="fr-FR" dirty="0" err="1" smtClean="0">
-                <a:latin typeface="Arial" panose="020B0604020202020204" pitchFamily="34" charset="0"/>
-                <a:cs typeface="Arial" panose="020B0604020202020204" pitchFamily="34" charset="0"/>
-              </a:rPr>
-              <a:t>GoogleMap</a:t>
-            </a:r>
-            <a:r>
-              <a:rPr lang="fr-FR" dirty="0" smtClean="0">
-                <a:latin typeface="Arial" panose="020B0604020202020204" pitchFamily="34" charset="0"/>
-                <a:cs typeface="Arial" panose="020B0604020202020204" pitchFamily="34" charset="0"/>
-              </a:rPr>
-              <a:t> et </a:t>
-            </a:r>
-            <a:r>
-              <a:rPr lang="fr-FR" dirty="0" err="1" smtClean="0">
-                <a:latin typeface="Arial" panose="020B0604020202020204" pitchFamily="34" charset="0"/>
-                <a:cs typeface="Arial" panose="020B0604020202020204" pitchFamily="34" charset="0"/>
-              </a:rPr>
-              <a:t>GoogleMarkers</a:t>
-            </a:r>
-            <a:endParaRPr lang="fr-FR" dirty="0" smtClean="0">
-              <a:latin typeface="Arial" panose="020B0604020202020204" pitchFamily="34" charset="0"/>
-              <a:cs typeface="Arial" panose="020B0604020202020204" pitchFamily="34" charset="0"/>
-            </a:endParaRPr>
-          </a:p>
-          <a:p>
-            <a:pPr marL="285750" indent="-285750" algn="just">
-              <a:buFontTx/>
-              <a:buChar char="-"/>
-            </a:pPr>
-            <a:endParaRPr lang="fr-FR" dirty="0">
-              <a:latin typeface="Arial" panose="020B0604020202020204" pitchFamily="34" charset="0"/>
-              <a:cs typeface="Arial" panose="020B0604020202020204" pitchFamily="34" charset="0"/>
-            </a:endParaRPr>
-          </a:p>
-          <a:p>
-            <a:pPr marL="285750" indent="-285750" algn="just">
-              <a:buFontTx/>
-              <a:buChar char="-"/>
-            </a:pPr>
-            <a:r>
-              <a:rPr lang="fr-FR" dirty="0" smtClean="0">
-                <a:latin typeface="Arial" panose="020B0604020202020204" pitchFamily="34" charset="0"/>
-                <a:cs typeface="Arial" panose="020B0604020202020204" pitchFamily="34" charset="0"/>
-              </a:rPr>
-              <a:t>Un dossier « store » contenant le Store : </a:t>
-            </a:r>
-            <a:r>
-              <a:rPr lang="fr-FR" dirty="0" err="1" smtClean="0">
-                <a:latin typeface="Arial" panose="020B0604020202020204" pitchFamily="34" charset="0"/>
-                <a:cs typeface="Arial" panose="020B0604020202020204" pitchFamily="34" charset="0"/>
-              </a:rPr>
-              <a:t>Vuex</a:t>
-            </a:r>
-            <a:endParaRPr lang="fr-FR" dirty="0" smtClean="0">
-              <a:latin typeface="Arial" panose="020B0604020202020204" pitchFamily="34" charset="0"/>
-              <a:cs typeface="Arial" panose="020B0604020202020204" pitchFamily="34" charset="0"/>
-            </a:endParaRPr>
-          </a:p>
-          <a:p>
-            <a:pPr marL="285750" indent="-285750" algn="just">
-              <a:buFontTx/>
-              <a:buChar char="-"/>
-            </a:pPr>
-            <a:endParaRPr lang="fr-FR" dirty="0">
-              <a:latin typeface="Arial" panose="020B0604020202020204" pitchFamily="34" charset="0"/>
-              <a:cs typeface="Arial" panose="020B0604020202020204" pitchFamily="34" charset="0"/>
-            </a:endParaRPr>
-          </a:p>
-          <a:p>
-            <a:pPr marL="285750" indent="-285750" algn="just">
-              <a:buFontTx/>
-              <a:buChar char="-"/>
-            </a:pPr>
-            <a:r>
-              <a:rPr lang="fr-FR" dirty="0" smtClean="0">
-                <a:latin typeface="Arial" panose="020B0604020202020204" pitchFamily="34" charset="0"/>
-                <a:cs typeface="Arial" panose="020B0604020202020204" pitchFamily="34" charset="0"/>
-              </a:rPr>
-              <a:t>CSS Responsive (</a:t>
-            </a:r>
-            <a:r>
-              <a:rPr lang="fr-FR" dirty="0" err="1" smtClean="0">
-                <a:latin typeface="Arial" panose="020B0604020202020204" pitchFamily="34" charset="0"/>
-                <a:cs typeface="Arial" panose="020B0604020202020204" pitchFamily="34" charset="0"/>
-              </a:rPr>
-              <a:t>Bootstrap</a:t>
-            </a:r>
-            <a:r>
-              <a:rPr lang="fr-FR" dirty="0" smtClean="0">
-                <a:latin typeface="Arial" panose="020B0604020202020204" pitchFamily="34" charset="0"/>
-                <a:cs typeface="Arial" panose="020B0604020202020204" pitchFamily="34" charset="0"/>
-              </a:rPr>
-              <a:t> 4 </a:t>
-            </a:r>
-            <a:r>
-              <a:rPr lang="fr-FR" dirty="0" err="1" smtClean="0">
-                <a:latin typeface="Arial" panose="020B0604020202020204" pitchFamily="34" charset="0"/>
-                <a:cs typeface="Arial" panose="020B0604020202020204" pitchFamily="34" charset="0"/>
-              </a:rPr>
-              <a:t>breakpoints</a:t>
-            </a:r>
-            <a:r>
-              <a:rPr lang="fr-FR" dirty="0" smtClean="0">
-                <a:latin typeface="Arial" panose="020B0604020202020204" pitchFamily="34" charset="0"/>
-                <a:cs typeface="Arial" panose="020B0604020202020204" pitchFamily="34" charset="0"/>
-              </a:rPr>
-              <a:t>)</a:t>
-            </a:r>
-          </a:p>
-          <a:p>
-            <a:pPr marL="285750" indent="-285750" algn="just">
-              <a:buFontTx/>
-              <a:buChar char="-"/>
-            </a:pPr>
-            <a:endParaRPr lang="fr-FR" dirty="0">
-              <a:latin typeface="Arial" panose="020B0604020202020204" pitchFamily="34" charset="0"/>
-              <a:cs typeface="Arial" panose="020B0604020202020204" pitchFamily="34" charset="0"/>
-            </a:endParaRPr>
-          </a:p>
-          <a:p>
-            <a:pPr marL="285750" indent="-285750" algn="just">
-              <a:buFontTx/>
-              <a:buChar char="-"/>
-            </a:pPr>
-            <a:endParaRPr lang="fr-FR" dirty="0" smtClean="0">
-              <a:latin typeface="Arial" panose="020B0604020202020204" pitchFamily="34" charset="0"/>
-              <a:cs typeface="Arial" panose="020B0604020202020204" pitchFamily="34" charset="0"/>
-            </a:endParaRPr>
-          </a:p>
-          <a:p>
-            <a:pPr marL="285750" indent="-285750" algn="just">
-              <a:buFontTx/>
-              <a:buChar char="-"/>
-            </a:pPr>
-            <a:endParaRPr lang="fr-FR" dirty="0">
-              <a:latin typeface="Arial" panose="020B0604020202020204" pitchFamily="34" charset="0"/>
-              <a:cs typeface="Arial" panose="020B0604020202020204" pitchFamily="34" charset="0"/>
-            </a:endParaRPr>
-          </a:p>
-          <a:p>
-            <a:pPr marL="285750" indent="-285750" algn="just">
-              <a:buFontTx/>
-              <a:buChar char="-"/>
-            </a:pPr>
-            <a:endParaRPr lang="en-US" dirty="0">
-              <a:latin typeface="Arial" panose="020B0604020202020204" pitchFamily="34" charset="0"/>
-              <a:cs typeface="Arial" panose="020B0604020202020204" pitchFamily="34" charset="0"/>
-            </a:endParaRPr>
-          </a:p>
-        </p:txBody>
-      </p:sp>
-    </p:spTree>
-    <p:extLst>
-      <p:ext uri="{BB962C8B-B14F-4D97-AF65-F5344CB8AC3E}">
-        <p14:creationId xmlns:p14="http://schemas.microsoft.com/office/powerpoint/2010/main" val="1803882588"/>
-      </p:ext>
-    </p:extLst>
-  </p:cSld>
-  <p:clrMapOvr>
-    <a:masterClrMapping/>
-  </p:clrMapOvr>
-  <p:timing>
-    <p:tnLst>
-      <p:par>
-        <p:cTn id="1" dur="indefinite" restart="never" nodeType="tmRoot"/>
-      </p:par>
-    </p:tnLst>
-  </p:timing>
-</p:sld>
-</file>
-
 <file path=ppt/slides/slide6.xml><?xml version="1.0" encoding="utf-8"?>
 <p:sld xmlns:a="http://schemas.openxmlformats.org/drawingml/2006/main" xmlns:r="http://schemas.openxmlformats.org/officeDocument/2006/relationships" xmlns:p="http://schemas.openxmlformats.org/presentationml/2006/main">
   <p:cSld>
@@ -8837,7 +9119,7 @@
                 <a:latin typeface="Arial" panose="020B0604020202020204" pitchFamily="34" charset="0"/>
                 <a:cs typeface="Arial" panose="020B0604020202020204" pitchFamily="34" charset="0"/>
               </a:rPr>
-              <a:t>Etape 2 : ajoutez des restaurants et des avis !</a:t>
+              <a:t>Etape 1 : la carte des restaurants</a:t>
             </a:r>
             <a:endParaRPr lang="en-US" sz="2000" b="1" dirty="0">
               <a:latin typeface="Arial" panose="020B0604020202020204" pitchFamily="34" charset="0"/>
@@ -8855,7 +9137,7 @@
         <p:spPr>
           <a:xfrm>
             <a:off x="2347546" y="1251439"/>
-            <a:ext cx="9469316" cy="2862322"/>
+            <a:ext cx="9469316" cy="4524315"/>
           </a:xfrm>
           <a:prstGeom prst="rect">
             <a:avLst/>
@@ -8894,35 +9176,22 @@
                 <a:latin typeface="Arial" panose="020B0604020202020204" pitchFamily="34" charset="0"/>
                 <a:cs typeface="Arial" panose="020B0604020202020204" pitchFamily="34" charset="0"/>
               </a:rPr>
-              <a:t>La possibilité pour l’utilisateur d’ajouter un avis sur le restaurant</a:t>
-            </a:r>
-          </a:p>
-          <a:p>
-            <a:pPr marL="285750" indent="-285750" algn="just">
-              <a:buFontTx/>
-              <a:buChar char="-"/>
-            </a:pPr>
-            <a:endParaRPr lang="fr-FR" dirty="0">
-              <a:latin typeface="Arial" panose="020B0604020202020204" pitchFamily="34" charset="0"/>
-              <a:cs typeface="Arial" panose="020B0604020202020204" pitchFamily="34" charset="0"/>
-            </a:endParaRPr>
-          </a:p>
-          <a:p>
-            <a:pPr marL="285750" indent="-285750" algn="just">
-              <a:buFontTx/>
-              <a:buChar char="-"/>
-            </a:pPr>
+              <a:t>Une carte Google </a:t>
+            </a:r>
+            <a:r>
+              <a:rPr lang="fr-FR" dirty="0" err="1" smtClean="0">
+                <a:latin typeface="Arial" panose="020B0604020202020204" pitchFamily="34" charset="0"/>
+                <a:cs typeface="Arial" panose="020B0604020202020204" pitchFamily="34" charset="0"/>
+              </a:rPr>
+              <a:t>Maps</a:t>
+            </a:r>
             <a:r>
               <a:rPr lang="fr-FR" dirty="0" smtClean="0">
                 <a:latin typeface="Arial" panose="020B0604020202020204" pitchFamily="34" charset="0"/>
                 <a:cs typeface="Arial" panose="020B0604020202020204" pitchFamily="34" charset="0"/>
               </a:rPr>
-              <a:t>Au clique sur un endroit de la carte, possibilité d’ajouter un restaurant</a:t>
-            </a:r>
-            <a:endParaRPr lang="fr-FR" dirty="0">
-              <a:latin typeface="Arial" panose="020B0604020202020204" pitchFamily="34" charset="0"/>
-              <a:cs typeface="Arial" panose="020B0604020202020204" pitchFamily="34" charset="0"/>
-            </a:endParaRPr>
+              <a:t> et une liste des restaurants correspondant à la zone affichée</a:t>
+            </a:r>
           </a:p>
           <a:p>
             <a:pPr marL="285750" indent="-285750" algn="just">
@@ -8944,7 +9213,7 @@
                 <a:latin typeface="Arial" panose="020B0604020202020204" pitchFamily="34" charset="0"/>
                 <a:cs typeface="Arial" panose="020B0604020202020204" pitchFamily="34" charset="0"/>
               </a:rPr>
-              <a:t>Puis affichage de ce nouveau restaurant sur la carte, avec marqueur</a:t>
+              <a:t>Ces deux éléments placés côte à côte. </a:t>
             </a:r>
           </a:p>
           <a:p>
@@ -8952,7 +9221,7 @@
               <a:buFontTx/>
               <a:buChar char="-"/>
             </a:pPr>
-            <a:endParaRPr lang="fr-FR" dirty="0">
+            <a:endParaRPr lang="fr-FR" dirty="0" smtClean="0">
               <a:latin typeface="Arial" panose="020B0604020202020204" pitchFamily="34" charset="0"/>
               <a:cs typeface="Arial" panose="020B0604020202020204" pitchFamily="34" charset="0"/>
             </a:endParaRPr>
@@ -8967,15 +9236,122 @@
                 <a:latin typeface="Arial" panose="020B0604020202020204" pitchFamily="34" charset="0"/>
                 <a:cs typeface="Arial" panose="020B0604020202020204" pitchFamily="34" charset="0"/>
               </a:rPr>
-              <a:t>Ces nouvelles données disparaissent si on quitte ou rafraichit la page, donc non enregistrées dans le fichier JSON.</a:t>
-            </a:r>
+              <a:t>Demande de géolocalisation avec centrage sur la position de l’utilisateur et marqueur spécifique</a:t>
+            </a:r>
+          </a:p>
+          <a:p>
+            <a:pPr marL="285750" indent="-285750" algn="just">
+              <a:buFontTx/>
+              <a:buChar char="-"/>
+            </a:pPr>
+            <a:endParaRPr lang="fr-FR" dirty="0" smtClean="0">
+              <a:latin typeface="Arial" panose="020B0604020202020204" pitchFamily="34" charset="0"/>
+              <a:cs typeface="Arial" panose="020B0604020202020204" pitchFamily="34" charset="0"/>
+            </a:endParaRPr>
+          </a:p>
+          <a:p>
+            <a:pPr marL="285750" indent="-285750" algn="just">
+              <a:buFontTx/>
+              <a:buChar char="-"/>
+            </a:pPr>
+            <a:r>
+              <a:rPr lang="fr-FR" dirty="0" smtClean="0">
+                <a:latin typeface="Arial" panose="020B0604020202020204" pitchFamily="34" charset="0"/>
+                <a:cs typeface="Arial" panose="020B0604020202020204" pitchFamily="34" charset="0"/>
+              </a:rPr>
+              <a:t>Une liste de restaurants chargée depuis un fichier JSON</a:t>
+            </a:r>
+          </a:p>
+          <a:p>
+            <a:pPr marL="285750" indent="-285750" algn="just">
+              <a:buFontTx/>
+              <a:buChar char="-"/>
+            </a:pPr>
+            <a:endParaRPr lang="fr-FR" dirty="0" smtClean="0">
+              <a:latin typeface="Arial" panose="020B0604020202020204" pitchFamily="34" charset="0"/>
+              <a:cs typeface="Arial" panose="020B0604020202020204" pitchFamily="34" charset="0"/>
+            </a:endParaRPr>
+          </a:p>
+          <a:p>
+            <a:pPr marL="285750" indent="-285750" algn="just">
+              <a:buFontTx/>
+              <a:buChar char="-"/>
+            </a:pPr>
+            <a:r>
+              <a:rPr lang="fr-FR" dirty="0" smtClean="0">
+                <a:latin typeface="Arial" panose="020B0604020202020204" pitchFamily="34" charset="0"/>
+                <a:cs typeface="Arial" panose="020B0604020202020204" pitchFamily="34" charset="0"/>
+              </a:rPr>
+              <a:t>Afficher dans la liste globale, la moyenne des avis reçus par chacun des restaurants</a:t>
+            </a:r>
+          </a:p>
+          <a:p>
+            <a:pPr marL="285750" indent="-285750" algn="just">
+              <a:buFontTx/>
+              <a:buChar char="-"/>
+            </a:pPr>
+            <a:endParaRPr lang="fr-FR" dirty="0" smtClean="0">
+              <a:latin typeface="Arial" panose="020B0604020202020204" pitchFamily="34" charset="0"/>
+              <a:cs typeface="Arial" panose="020B0604020202020204" pitchFamily="34" charset="0"/>
+            </a:endParaRPr>
+          </a:p>
+          <a:p>
+            <a:pPr marL="285750" indent="-285750" algn="just">
+              <a:buFontTx/>
+              <a:buChar char="-"/>
+            </a:pPr>
+            <a:r>
+              <a:rPr lang="fr-FR" dirty="0" smtClean="0">
+                <a:latin typeface="Arial" panose="020B0604020202020204" pitchFamily="34" charset="0"/>
+                <a:cs typeface="Arial" panose="020B0604020202020204" pitchFamily="34" charset="0"/>
+              </a:rPr>
+              <a:t>Au clique sur un restaurant, on peut lire les commentaires + photo Google Street </a:t>
+            </a:r>
+            <a:r>
+              <a:rPr lang="fr-FR" dirty="0" err="1" smtClean="0">
+                <a:latin typeface="Arial" panose="020B0604020202020204" pitchFamily="34" charset="0"/>
+                <a:cs typeface="Arial" panose="020B0604020202020204" pitchFamily="34" charset="0"/>
+              </a:rPr>
+              <a:t>View</a:t>
+            </a:r>
+            <a:endParaRPr lang="fr-FR" dirty="0" smtClean="0">
+              <a:latin typeface="Arial" panose="020B0604020202020204" pitchFamily="34" charset="0"/>
+              <a:cs typeface="Arial" panose="020B0604020202020204" pitchFamily="34" charset="0"/>
+            </a:endParaRPr>
+          </a:p>
+          <a:p>
+            <a:pPr marL="285750" indent="-285750" algn="just">
+              <a:buFontTx/>
+              <a:buChar char="-"/>
+            </a:pPr>
+            <a:endParaRPr lang="fr-FR" dirty="0" smtClean="0">
+              <a:latin typeface="Arial" panose="020B0604020202020204" pitchFamily="34" charset="0"/>
+              <a:cs typeface="Arial" panose="020B0604020202020204" pitchFamily="34" charset="0"/>
+            </a:endParaRPr>
+          </a:p>
+          <a:p>
+            <a:pPr marL="285750" indent="-285750" algn="just">
+              <a:buFontTx/>
+              <a:buChar char="-"/>
+            </a:pPr>
+            <a:r>
+              <a:rPr lang="fr-FR" dirty="0" smtClean="0">
+                <a:latin typeface="Arial" panose="020B0604020202020204" pitchFamily="34" charset="0"/>
+                <a:cs typeface="Arial" panose="020B0604020202020204" pitchFamily="34" charset="0"/>
+              </a:rPr>
+              <a:t>Possibilité de filtrer les restaurants en fonction de la moyenne des avis</a:t>
+            </a:r>
+            <a:endParaRPr lang="en-US" dirty="0">
+              <a:latin typeface="Arial" panose="020B0604020202020204" pitchFamily="34" charset="0"/>
+              <a:cs typeface="Arial" panose="020B0604020202020204" pitchFamily="34" charset="0"/>
+            </a:endParaRPr>
           </a:p>
         </p:txBody>
       </p:sp>
     </p:spTree>
     <p:extLst>
       <p:ext uri="{BB962C8B-B14F-4D97-AF65-F5344CB8AC3E}">
-        <p14:creationId xmlns:p14="http://schemas.microsoft.com/office/powerpoint/2010/main" val="3694183597"/>
+        <p14:creationId xmlns:p14="http://schemas.microsoft.com/office/powerpoint/2010/main" val="265086280"/>
       </p:ext>
     </p:extLst>
   </p:cSld>
@@ -9037,7 +9413,7 @@
                 <a:latin typeface="Arial" panose="020B0604020202020204" pitchFamily="34" charset="0"/>
                 <a:cs typeface="Arial" panose="020B0604020202020204" pitchFamily="34" charset="0"/>
               </a:rPr>
-              <a:t>Etape 3 : intégration avec l'API de Google Places</a:t>
+              <a:t>Etape 2 : ajoutez des restaurants et des avis !</a:t>
             </a:r>
             <a:endParaRPr lang="en-US" sz="2000" b="1" dirty="0">
               <a:latin typeface="Arial" panose="020B0604020202020204" pitchFamily="34" charset="0"/>
@@ -9055,7 +9431,7 @@
         <p:spPr>
           <a:xfrm>
             <a:off x="2347546" y="1251439"/>
-            <a:ext cx="9469316" cy="2031325"/>
+            <a:ext cx="9469316" cy="2862322"/>
           </a:xfrm>
           <a:prstGeom prst="rect">
             <a:avLst/>
@@ -9094,14 +9470,7 @@
                 <a:latin typeface="Arial" panose="020B0604020202020204" pitchFamily="34" charset="0"/>
                 <a:cs typeface="Arial" panose="020B0604020202020204" pitchFamily="34" charset="0"/>
               </a:rPr>
-              <a:t>Intégrer l’API Google Places pour afficher plus de restaurants et de commentaires autour de la position de </a:t>
-            </a:r>
-            <a:r>
-              <a:rPr lang="fr-FR" dirty="0" smtClean="0">
-                <a:latin typeface="Arial" panose="020B0604020202020204" pitchFamily="34" charset="0"/>
-                <a:cs typeface="Arial" panose="020B0604020202020204" pitchFamily="34" charset="0"/>
-              </a:rPr>
-              <a:t>l’utilisateur</a:t>
+              <a:t>La possibilité pour l’utilisateur d’ajouter un avis sur le restaurant</a:t>
             </a:r>
           </a:p>
           <a:p>
@@ -9115,25 +9484,74 @@
             </a:endParaRPr>
           </a:p>
           <a:p>
-            <a:pPr algn="just"/>
+            <a:pPr marL="285750" indent="-285750" algn="just">
+              <a:buFontTx/>
+              <a:buChar char="-"/>
+            </a:pPr>
             <a:r>
               <a:rPr lang="fr-FR" dirty="0" smtClean="0">
                 <a:latin typeface="Arial" panose="020B0604020202020204" pitchFamily="34" charset="0"/>
                 <a:cs typeface="Arial" panose="020B0604020202020204" pitchFamily="34" charset="0"/>
               </a:rPr>
-              <a:t>Le choix a été fait d’afficher les restaurants autour de la position de l’utilisateur, et non de prévoir un champ recherche, pas assez ciblé et direct.</a:t>
-            </a:r>
+              <a:t>Au clique sur un endroit de la carte, possibilité d’ajouter un restaurant</a:t>
+            </a:r>
+            <a:endParaRPr lang="fr-FR" dirty="0">
+              <a:latin typeface="Arial" panose="020B0604020202020204" pitchFamily="34" charset="0"/>
+              <a:cs typeface="Arial" panose="020B0604020202020204" pitchFamily="34" charset="0"/>
+            </a:endParaRPr>
+          </a:p>
+          <a:p>
+            <a:pPr marL="285750" indent="-285750" algn="just">
+              <a:buFontTx/>
+              <a:buChar char="-"/>
+            </a:pPr>
             <a:endParaRPr lang="fr-FR" dirty="0" smtClean="0">
               <a:latin typeface="Arial" panose="020B0604020202020204" pitchFamily="34" charset="0"/>
               <a:cs typeface="Arial" panose="020B0604020202020204" pitchFamily="34" charset="0"/>
             </a:endParaRPr>
           </a:p>
+          <a:p>
+            <a:pPr marL="285750" indent="-285750" algn="just">
+              <a:buFontTx/>
+              <a:buChar char="-"/>
+            </a:pPr>
+            <a:r>
+              <a:rPr lang="fr-FR" dirty="0" smtClean="0">
+                <a:latin typeface="Arial" panose="020B0604020202020204" pitchFamily="34" charset="0"/>
+                <a:cs typeface="Arial" panose="020B0604020202020204" pitchFamily="34" charset="0"/>
+              </a:rPr>
+              <a:t>Puis affichage de ce nouveau restaurant sur la carte, avec marqueur</a:t>
+            </a:r>
+          </a:p>
+          <a:p>
+            <a:pPr marL="285750" indent="-285750" algn="just">
+              <a:buFontTx/>
+              <a:buChar char="-"/>
+            </a:pPr>
+            <a:endParaRPr lang="fr-FR" dirty="0">
+              <a:latin typeface="Arial" panose="020B0604020202020204" pitchFamily="34" charset="0"/>
+              <a:cs typeface="Arial" panose="020B0604020202020204" pitchFamily="34" charset="0"/>
+            </a:endParaRPr>
+          </a:p>
+          <a:p>
+            <a:pPr marL="285750" indent="-285750" algn="just">
+              <a:buFontTx/>
+              <a:buChar char="-"/>
+            </a:pPr>
+            <a:r>
+              <a:rPr lang="fr-FR" dirty="0" smtClean="0">
+                <a:latin typeface="Arial" panose="020B0604020202020204" pitchFamily="34" charset="0"/>
+                <a:cs typeface="Arial" panose="020B0604020202020204" pitchFamily="34" charset="0"/>
+              </a:rPr>
+              <a:t>Ces nouvelles données disparaissent si on quitte ou rafraichit la page, donc non enregistrées dans le fichier JSON.</a:t>
+            </a:r>
+          </a:p>
         </p:txBody>
       </p:sp>
     </p:spTree>
     <p:extLst>
       <p:ext uri="{BB962C8B-B14F-4D97-AF65-F5344CB8AC3E}">
-        <p14:creationId xmlns:p14="http://schemas.microsoft.com/office/powerpoint/2010/main" val="4222878362"/>
+        <p14:creationId xmlns:p14="http://schemas.microsoft.com/office/powerpoint/2010/main" val="3694183597"/>
       </p:ext>
     </p:extLst>
   </p:cSld>
@@ -9195,7 +9613,7 @@
                 <a:latin typeface="Arial" panose="020B0604020202020204" pitchFamily="34" charset="0"/>
                 <a:cs typeface="Arial" panose="020B0604020202020204" pitchFamily="34" charset="0"/>
               </a:rPr>
-              <a:t>Réflexion sur le projet</a:t>
+              <a:t>Etape 3 : intégration avec l'API de Google Places</a:t>
             </a:r>
             <a:endParaRPr lang="en-US" sz="2000" b="1" dirty="0">
               <a:latin typeface="Arial" panose="020B0604020202020204" pitchFamily="34" charset="0"/>
@@ -9213,7 +9631,7 @@
         <p:spPr>
           <a:xfrm>
             <a:off x="2347546" y="1251439"/>
-            <a:ext cx="9469316" cy="3139321"/>
+            <a:ext cx="9469316" cy="2031325"/>
           </a:xfrm>
           <a:prstGeom prst="rect">
             <a:avLst/>
@@ -9228,12 +9646,202 @@
           <a:p>
             <a:pPr algn="just"/>
             <a:r>
+              <a:rPr lang="fr-FR" b="1" dirty="0" smtClean="0">
+                <a:latin typeface="Arial" panose="020B0604020202020204" pitchFamily="34" charset="0"/>
+                <a:cs typeface="Arial" panose="020B0604020202020204" pitchFamily="34" charset="0"/>
+              </a:rPr>
+              <a:t>Objectifs :</a:t>
+            </a:r>
+          </a:p>
+          <a:p>
+            <a:pPr algn="just"/>
+            <a:endParaRPr lang="fr-FR" dirty="0" smtClean="0">
+              <a:latin typeface="Arial" panose="020B0604020202020204" pitchFamily="34" charset="0"/>
+              <a:cs typeface="Arial" panose="020B0604020202020204" pitchFamily="34" charset="0"/>
+            </a:endParaRPr>
+          </a:p>
+          <a:p>
+            <a:pPr marL="285750" indent="-285750" algn="just">
+              <a:buFontTx/>
+              <a:buChar char="-"/>
+            </a:pPr>
+            <a:r>
               <a:rPr lang="fr-FR" dirty="0" smtClean="0">
                 <a:latin typeface="Arial" panose="020B0604020202020204" pitchFamily="34" charset="0"/>
                 <a:cs typeface="Arial" panose="020B0604020202020204" pitchFamily="34" charset="0"/>
               </a:rPr>
-              <a:t>Dans un cadre professionnel, utiliser le plugin vue2-google-maps pour gagner en confort, simplicité et rapidité</a:t>
-            </a:r>
+              <a:t>Intégrer l’API Google Places pour afficher plus de restaurants et de commentaires autour de la position de l’utilisateur</a:t>
+            </a:r>
+          </a:p>
+          <a:p>
+            <a:pPr marL="285750" indent="-285750" algn="just">
+              <a:buFontTx/>
+              <a:buChar char="-"/>
+            </a:pPr>
+            <a:endParaRPr lang="fr-FR" dirty="0">
+              <a:latin typeface="Arial" panose="020B0604020202020204" pitchFamily="34" charset="0"/>
+              <a:cs typeface="Arial" panose="020B0604020202020204" pitchFamily="34" charset="0"/>
+            </a:endParaRPr>
+          </a:p>
+          <a:p>
+            <a:pPr algn="just"/>
+            <a:r>
+              <a:rPr lang="fr-FR" dirty="0" smtClean="0">
+                <a:latin typeface="Arial" panose="020B0604020202020204" pitchFamily="34" charset="0"/>
+                <a:cs typeface="Arial" panose="020B0604020202020204" pitchFamily="34" charset="0"/>
+              </a:rPr>
+              <a:t>Le choix a été fait d’afficher les restaurants autour de la position de </a:t>
+            </a:r>
+            <a:r>
+              <a:rPr lang="fr-FR" dirty="0" smtClean="0">
+                <a:latin typeface="Arial" panose="020B0604020202020204" pitchFamily="34" charset="0"/>
+                <a:cs typeface="Arial" panose="020B0604020202020204" pitchFamily="34" charset="0"/>
+              </a:rPr>
+              <a:t>l’utilisateur</a:t>
+            </a:r>
+            <a:r>
+              <a:rPr lang="fr-FR" dirty="0">
+                <a:latin typeface="Arial" panose="020B0604020202020204" pitchFamily="34" charset="0"/>
+                <a:cs typeface="Arial" panose="020B0604020202020204" pitchFamily="34" charset="0"/>
+              </a:rPr>
+              <a:t> </a:t>
+            </a:r>
+            <a:r>
+              <a:rPr lang="fr-FR" dirty="0" smtClean="0">
+                <a:latin typeface="Arial" panose="020B0604020202020204" pitchFamily="34" charset="0"/>
+                <a:cs typeface="Arial" panose="020B0604020202020204" pitchFamily="34" charset="0"/>
+              </a:rPr>
+              <a:t>pour une utilisation rapide et plus directe des données.</a:t>
+            </a:r>
+            <a:endParaRPr lang="fr-FR" dirty="0" smtClean="0">
+              <a:latin typeface="Arial" panose="020B0604020202020204" pitchFamily="34" charset="0"/>
+              <a:cs typeface="Arial" panose="020B0604020202020204" pitchFamily="34" charset="0"/>
+            </a:endParaRPr>
+          </a:p>
+        </p:txBody>
+      </p:sp>
+    </p:spTree>
+    <p:extLst>
+      <p:ext uri="{BB962C8B-B14F-4D97-AF65-F5344CB8AC3E}">
+        <p14:creationId xmlns:p14="http://schemas.microsoft.com/office/powerpoint/2010/main" val="4222878362"/>
+      </p:ext>
+    </p:extLst>
+  </p:cSld>
+  <p:clrMapOvr>
+    <a:masterClrMapping/>
+  </p:clrMapOvr>
+  <p:timing>
+    <p:tnLst>
+      <p:par>
+        <p:cTn id="1" dur="indefinite" restart="never" nodeType="tmRoot"/>
+      </p:par>
+    </p:tnLst>
+  </p:timing>
+</p:sld>
+</file>
+
+<file path=ppt/slides/slide9.xml><?xml version="1.0" encoding="utf-8"?>
+<p:sld xmlns:a="http://schemas.openxmlformats.org/drawingml/2006/main" xmlns:r="http://schemas.openxmlformats.org/officeDocument/2006/relationships" xmlns:p="http://schemas.openxmlformats.org/presentationml/2006/main">
+  <p:cSld>
+    <p:spTree>
+      <p:nvGrpSpPr>
+        <p:cNvPr id="1" name=""/>
+        <p:cNvGrpSpPr/>
+        <p:nvPr/>
+      </p:nvGrpSpPr>
+      <p:grpSpPr>
+        <a:xfrm>
+          <a:off x="0" y="0"/>
+          <a:ext cx="0" cy="0"/>
+          <a:chOff x="0" y="0"/>
+          <a:chExt cx="0" cy="0"/>
+        </a:xfrm>
+      </p:grpSpPr>
+      <p:sp>
+        <p:nvSpPr>
+          <p:cNvPr id="5" name="TextBox 4"/>
+          <p:cNvSpPr txBox="1"/>
+          <p:nvPr/>
+        </p:nvSpPr>
+        <p:spPr>
+          <a:xfrm>
+            <a:off x="2347546" y="334108"/>
+            <a:ext cx="9469316" cy="400110"/>
+          </a:xfrm>
+          <a:prstGeom prst="rect">
+            <a:avLst/>
+          </a:prstGeom>
+          <a:noFill/>
+        </p:spPr>
+        <p:txBody>
+          <a:bodyPr wrap="square" rtlCol="0">
+            <a:spAutoFit/>
+          </a:bodyPr>
+          <a:lstStyle/>
+          <a:p>
+            <a:pPr algn="just"/>
+            <a:r>
+              <a:rPr lang="fr-FR" sz="2000" b="1" dirty="0" smtClean="0">
+                <a:latin typeface="Arial" panose="020B0604020202020204" pitchFamily="34" charset="0"/>
+                <a:cs typeface="Arial" panose="020B0604020202020204" pitchFamily="34" charset="0"/>
+              </a:rPr>
+              <a:t>Réflexion sur le projet</a:t>
+            </a:r>
+            <a:endParaRPr lang="en-US" sz="2000" b="1" dirty="0">
+              <a:latin typeface="Arial" panose="020B0604020202020204" pitchFamily="34" charset="0"/>
+              <a:cs typeface="Arial" panose="020B0604020202020204" pitchFamily="34" charset="0"/>
+            </a:endParaRPr>
+          </a:p>
+        </p:txBody>
+      </p:sp>
+      <p:sp>
+        <p:nvSpPr>
+          <p:cNvPr id="6" name="TextBox 5"/>
+          <p:cNvSpPr txBox="1"/>
+          <p:nvPr/>
+        </p:nvSpPr>
+        <p:spPr>
+          <a:xfrm>
+            <a:off x="2347546" y="1251439"/>
+            <a:ext cx="9469316" cy="2308324"/>
+          </a:xfrm>
+          <a:prstGeom prst="rect">
+            <a:avLst/>
+          </a:prstGeom>
+          <a:noFill/>
+        </p:spPr>
+        <p:txBody>
+          <a:bodyPr wrap="square" rtlCol="0">
+            <a:spAutoFit/>
+          </a:bodyPr>
+          <a:lstStyle/>
+          <a:p>
+            <a:pPr algn="just"/>
+            <a:r>
+              <a:rPr lang="fr-FR" dirty="0" smtClean="0">
+                <a:latin typeface="Arial" panose="020B0604020202020204" pitchFamily="34" charset="0"/>
+                <a:cs typeface="Arial" panose="020B0604020202020204" pitchFamily="34" charset="0"/>
+              </a:rPr>
+              <a:t>Dans un cadre professionnel, utiliser le plugin vue2-google-maps pour gagner en confort, simplicité et </a:t>
+            </a:r>
+            <a:r>
+              <a:rPr lang="fr-FR" dirty="0" smtClean="0">
+                <a:latin typeface="Arial" panose="020B0604020202020204" pitchFamily="34" charset="0"/>
+                <a:cs typeface="Arial" panose="020B0604020202020204" pitchFamily="34" charset="0"/>
+              </a:rPr>
+              <a:t>rapidité, ainsi que réduire la possibilit</a:t>
+            </a:r>
+            <a:r>
+              <a:rPr lang="fr-FR" dirty="0" smtClean="0">
+                <a:latin typeface="Arial" panose="020B0604020202020204" pitchFamily="34" charset="0"/>
+                <a:cs typeface="Arial" panose="020B0604020202020204" pitchFamily="34" charset="0"/>
+              </a:rPr>
+              <a:t>é de bugs.</a:t>
+            </a:r>
+            <a:endParaRPr lang="fr-FR" dirty="0" smtClean="0">
+              <a:latin typeface="Arial" panose="020B0604020202020204" pitchFamily="34" charset="0"/>
+              <a:cs typeface="Arial" panose="020B0604020202020204" pitchFamily="34" charset="0"/>
+            </a:endParaRPr>
           </a:p>
           <a:p>
             <a:pPr algn="just"/>
@@ -9285,41 +9893,6 @@
               </a:rPr>
               <a:t>Intégrer la problématique de l’accessibilité  </a:t>
             </a:r>
-            <a:endParaRPr lang="fr-FR" dirty="0" smtClean="0">
-              <a:latin typeface="Arial" panose="020B0604020202020204" pitchFamily="34" charset="0"/>
-              <a:cs typeface="Arial" panose="020B0604020202020204" pitchFamily="34" charset="0"/>
-            </a:endParaRPr>
-          </a:p>
-          <a:p>
-            <a:pPr algn="just"/>
-            <a:endParaRPr lang="fr-FR" dirty="0">
-              <a:latin typeface="Arial" panose="020B0604020202020204" pitchFamily="34" charset="0"/>
-              <a:cs typeface="Arial" panose="020B0604020202020204" pitchFamily="34" charset="0"/>
-            </a:endParaRPr>
-          </a:p>
-          <a:p>
-            <a:pPr algn="just"/>
-            <a:r>
-              <a:rPr lang="fr-FR" dirty="0" smtClean="0">
-                <a:latin typeface="Arial" panose="020B0604020202020204" pitchFamily="34" charset="0"/>
-                <a:cs typeface="Arial" panose="020B0604020202020204" pitchFamily="34" charset="0"/>
-              </a:rPr>
-              <a:t>Mieux étudier l’implémentation de Google Places : </a:t>
-            </a:r>
-          </a:p>
-          <a:p>
-            <a:pPr algn="just"/>
-            <a:r>
-              <a:rPr lang="fr-FR" dirty="0" smtClean="0">
-                <a:latin typeface="Arial" panose="020B0604020202020204" pitchFamily="34" charset="0"/>
-                <a:cs typeface="Arial" panose="020B0604020202020204" pitchFamily="34" charset="0"/>
-              </a:rPr>
-              <a:t>- Afficher tous les restaurants sur la carte </a:t>
-            </a:r>
-            <a:endParaRPr lang="fr-FR" dirty="0" smtClean="0">
-              <a:latin typeface="Arial" panose="020B0604020202020204" pitchFamily="34" charset="0"/>
-              <a:cs typeface="Arial" panose="020B0604020202020204" pitchFamily="34" charset="0"/>
-            </a:endParaRPr>
           </a:p>
         </p:txBody>
       </p:sp>

</xml_diff>

<commit_message>
get.details de Google Places fonctionne
</commit_message>
<xml_diff>
--- a/Soutenance/Présentation Projet 7.pptx
+++ b/Soutenance/Présentation Projet 7.pptx
@@ -206,7 +206,7 @@
           <a:p>
             <a:fld id="{4D9A32CA-6F39-432B-8880-7503DE8A1282}" type="datetimeFigureOut">
               <a:rPr lang="en-US" smtClean="0"/>
-              <a:t>6/22/2019</a:t>
+              <a:t>6/27/2019</a:t>
             </a:fld>
             <a:endParaRPr lang="en-US"/>
           </a:p>
@@ -1144,7 +1144,7 @@
           <a:p>
             <a:fld id="{51079C1D-1EC4-4844-9068-A6E79EAA45C6}" type="datetimeFigureOut">
               <a:rPr lang="en-US" smtClean="0"/>
-              <a:t>6/22/2019</a:t>
+              <a:t>6/27/2019</a:t>
             </a:fld>
             <a:endParaRPr lang="en-US"/>
           </a:p>
@@ -1440,7 +1440,7 @@
           <a:p>
             <a:fld id="{51079C1D-1EC4-4844-9068-A6E79EAA45C6}" type="datetimeFigureOut">
               <a:rPr lang="en-US" smtClean="0"/>
-              <a:t>6/22/2019</a:t>
+              <a:t>6/27/2019</a:t>
             </a:fld>
             <a:endParaRPr lang="en-US"/>
           </a:p>
@@ -1688,7 +1688,7 @@
           <a:p>
             <a:fld id="{51079C1D-1EC4-4844-9068-A6E79EAA45C6}" type="datetimeFigureOut">
               <a:rPr lang="en-US" smtClean="0"/>
-              <a:t>6/22/2019</a:t>
+              <a:t>6/27/2019</a:t>
             </a:fld>
             <a:endParaRPr lang="en-US"/>
           </a:p>
@@ -2228,7 +2228,7 @@
           <a:p>
             <a:fld id="{51079C1D-1EC4-4844-9068-A6E79EAA45C6}" type="datetimeFigureOut">
               <a:rPr lang="en-US" smtClean="0"/>
-              <a:t>6/22/2019</a:t>
+              <a:t>6/27/2019</a:t>
             </a:fld>
             <a:endParaRPr lang="en-US"/>
           </a:p>
@@ -2476,7 +2476,7 @@
           <a:p>
             <a:fld id="{51079C1D-1EC4-4844-9068-A6E79EAA45C6}" type="datetimeFigureOut">
               <a:rPr lang="en-US" smtClean="0"/>
-              <a:t>6/22/2019</a:t>
+              <a:t>6/27/2019</a:t>
             </a:fld>
             <a:endParaRPr lang="en-US"/>
           </a:p>
@@ -3008,7 +3008,7 @@
           <a:p>
             <a:fld id="{51079C1D-1EC4-4844-9068-A6E79EAA45C6}" type="datetimeFigureOut">
               <a:rPr lang="en-US" smtClean="0"/>
-              <a:t>6/22/2019</a:t>
+              <a:t>6/27/2019</a:t>
             </a:fld>
             <a:endParaRPr lang="en-US"/>
           </a:p>
@@ -3305,7 +3305,7 @@
           <a:p>
             <a:fld id="{51079C1D-1EC4-4844-9068-A6E79EAA45C6}" type="datetimeFigureOut">
               <a:rPr lang="en-US" smtClean="0"/>
-              <a:t>6/22/2019</a:t>
+              <a:t>6/27/2019</a:t>
             </a:fld>
             <a:endParaRPr lang="en-US"/>
           </a:p>
@@ -3479,7 +3479,7 @@
           <a:p>
             <a:fld id="{51079C1D-1EC4-4844-9068-A6E79EAA45C6}" type="datetimeFigureOut">
               <a:rPr lang="en-US" smtClean="0"/>
-              <a:t>6/22/2019</a:t>
+              <a:t>6/27/2019</a:t>
             </a:fld>
             <a:endParaRPr lang="en-US"/>
           </a:p>
@@ -3659,7 +3659,7 @@
           <a:p>
             <a:fld id="{51079C1D-1EC4-4844-9068-A6E79EAA45C6}" type="datetimeFigureOut">
               <a:rPr lang="en-US" smtClean="0"/>
-              <a:t>6/22/2019</a:t>
+              <a:t>6/27/2019</a:t>
             </a:fld>
             <a:endParaRPr lang="en-US"/>
           </a:p>
@@ -3829,7 +3829,7 @@
           <a:p>
             <a:fld id="{51079C1D-1EC4-4844-9068-A6E79EAA45C6}" type="datetimeFigureOut">
               <a:rPr lang="en-US" smtClean="0"/>
-              <a:t>6/22/2019</a:t>
+              <a:t>6/27/2019</a:t>
             </a:fld>
             <a:endParaRPr lang="en-US"/>
           </a:p>
@@ -4080,7 +4080,7 @@
           <a:p>
             <a:fld id="{51079C1D-1EC4-4844-9068-A6E79EAA45C6}" type="datetimeFigureOut">
               <a:rPr lang="en-US" smtClean="0"/>
-              <a:t>6/22/2019</a:t>
+              <a:t>6/27/2019</a:t>
             </a:fld>
             <a:endParaRPr lang="en-US"/>
           </a:p>
@@ -4377,7 +4377,7 @@
           <a:p>
             <a:fld id="{51079C1D-1EC4-4844-9068-A6E79EAA45C6}" type="datetimeFigureOut">
               <a:rPr lang="en-US" smtClean="0"/>
-              <a:t>6/22/2019</a:t>
+              <a:t>6/27/2019</a:t>
             </a:fld>
             <a:endParaRPr lang="en-US"/>
           </a:p>
@@ -4819,7 +4819,7 @@
           <a:p>
             <a:fld id="{51079C1D-1EC4-4844-9068-A6E79EAA45C6}" type="datetimeFigureOut">
               <a:rPr lang="en-US" smtClean="0"/>
-              <a:t>6/22/2019</a:t>
+              <a:t>6/27/2019</a:t>
             </a:fld>
             <a:endParaRPr lang="en-US"/>
           </a:p>
@@ -4937,7 +4937,7 @@
           <a:p>
             <a:fld id="{51079C1D-1EC4-4844-9068-A6E79EAA45C6}" type="datetimeFigureOut">
               <a:rPr lang="en-US" smtClean="0"/>
-              <a:t>6/22/2019</a:t>
+              <a:t>6/27/2019</a:t>
             </a:fld>
             <a:endParaRPr lang="en-US"/>
           </a:p>
@@ -5032,7 +5032,7 @@
           <a:p>
             <a:fld id="{51079C1D-1EC4-4844-9068-A6E79EAA45C6}" type="datetimeFigureOut">
               <a:rPr lang="en-US" smtClean="0"/>
-              <a:t>6/22/2019</a:t>
+              <a:t>6/27/2019</a:t>
             </a:fld>
             <a:endParaRPr lang="en-US"/>
           </a:p>
@@ -5315,7 +5315,7 @@
           <a:p>
             <a:fld id="{51079C1D-1EC4-4844-9068-A6E79EAA45C6}" type="datetimeFigureOut">
               <a:rPr lang="en-US" smtClean="0"/>
-              <a:t>6/22/2019</a:t>
+              <a:t>6/27/2019</a:t>
             </a:fld>
             <a:endParaRPr lang="en-US"/>
           </a:p>
@@ -5606,7 +5606,7 @@
           <a:p>
             <a:fld id="{51079C1D-1EC4-4844-9068-A6E79EAA45C6}" type="datetimeFigureOut">
               <a:rPr lang="en-US" smtClean="0"/>
-              <a:t>6/22/2019</a:t>
+              <a:t>6/27/2019</a:t>
             </a:fld>
             <a:endParaRPr lang="en-US"/>
           </a:p>
@@ -6136,7 +6136,7 @@
           <a:p>
             <a:fld id="{51079C1D-1EC4-4844-9068-A6E79EAA45C6}" type="datetimeFigureOut">
               <a:rPr lang="en-US" smtClean="0"/>
-              <a:t>6/22/2019</a:t>
+              <a:t>6/27/2019</a:t>
             </a:fld>
             <a:endParaRPr lang="en-US"/>
           </a:p>
@@ -6855,10 +6855,6 @@
               </a:rPr>
               <a:t>Merci pour l’attention accordée à ce projet</a:t>
             </a:r>
-            <a:endParaRPr lang="fr-FR" dirty="0" smtClean="0">
-              <a:latin typeface="Arial" panose="020B0604020202020204" pitchFamily="34" charset="0"/>
-              <a:cs typeface="Arial" panose="020B0604020202020204" pitchFamily="34" charset="0"/>
-            </a:endParaRPr>
           </a:p>
         </p:txBody>
       </p:sp>
@@ -7104,14 +7100,7 @@
                 <a:latin typeface="Arial" panose="020B0604020202020204" pitchFamily="34" charset="0"/>
                 <a:cs typeface="Arial" panose="020B0604020202020204" pitchFamily="34" charset="0"/>
               </a:rPr>
-              <a:t>, plugin Vue de </a:t>
-            </a:r>
-            <a:r>
-              <a:rPr lang="fr-FR" dirty="0" smtClean="0">
-                <a:latin typeface="Arial" panose="020B0604020202020204" pitchFamily="34" charset="0"/>
-                <a:cs typeface="Arial" panose="020B0604020202020204" pitchFamily="34" charset="0"/>
-              </a:rPr>
-              <a:t>Chrome </a:t>
+              <a:t>, plugin Vue de Chrome </a:t>
             </a:r>
             <a:r>
               <a:rPr lang="fr-FR" dirty="0" err="1" smtClean="0">
@@ -7145,14 +7134,7 @@
                 <a:latin typeface="Arial" panose="020B0604020202020204" pitchFamily="34" charset="0"/>
                 <a:cs typeface="Arial" panose="020B0604020202020204" pitchFamily="34" charset="0"/>
               </a:rPr>
-              <a:t>Continuer à apprendre à séparer mon code (composants) pour en faciliter la maintenance et la </a:t>
-            </a:r>
-            <a:r>
-              <a:rPr lang="fr-FR" dirty="0" smtClean="0">
-                <a:latin typeface="Arial" panose="020B0604020202020204" pitchFamily="34" charset="0"/>
-                <a:cs typeface="Arial" panose="020B0604020202020204" pitchFamily="34" charset="0"/>
-              </a:rPr>
-              <a:t>réutilisation</a:t>
+              <a:t>Continuer à apprendre à séparer mon code (composants) pour en faciliter la maintenance et la réutilisation</a:t>
             </a:r>
           </a:p>
           <a:p>
@@ -7750,14 +7732,7 @@
                 <a:latin typeface="Arial" panose="020B0604020202020204" pitchFamily="34" charset="0"/>
                 <a:cs typeface="Arial" panose="020B0604020202020204" pitchFamily="34" charset="0"/>
               </a:rPr>
-              <a:t>Architecture </a:t>
-            </a:r>
-            <a:r>
-              <a:rPr lang="fr-FR" sz="2000" b="1" dirty="0" smtClean="0">
-                <a:latin typeface="Arial" panose="020B0604020202020204" pitchFamily="34" charset="0"/>
-                <a:cs typeface="Arial" panose="020B0604020202020204" pitchFamily="34" charset="0"/>
-              </a:rPr>
-              <a:t>de l’application</a:t>
+              <a:t>Architecture de l’application</a:t>
             </a:r>
             <a:endParaRPr lang="en-US" sz="2000" b="1" dirty="0">
               <a:latin typeface="Arial" panose="020B0604020202020204" pitchFamily="34" charset="0"/>
@@ -8227,14 +8202,7 @@
                 <a:latin typeface="Arial" panose="020B0604020202020204" pitchFamily="34" charset="0"/>
                 <a:cs typeface="Arial" panose="020B0604020202020204" pitchFamily="34" charset="0"/>
               </a:rPr>
-              <a:t>Organisation </a:t>
-            </a:r>
-            <a:r>
-              <a:rPr lang="fr-FR" sz="2000" b="1" dirty="0" smtClean="0">
-                <a:latin typeface="Arial" panose="020B0604020202020204" pitchFamily="34" charset="0"/>
-                <a:cs typeface="Arial" panose="020B0604020202020204" pitchFamily="34" charset="0"/>
-              </a:rPr>
-              <a:t>des composants</a:t>
+              <a:t>Organisation des composants</a:t>
             </a:r>
             <a:endParaRPr lang="en-US" sz="2000" b="1" dirty="0">
               <a:latin typeface="Arial" panose="020B0604020202020204" pitchFamily="34" charset="0"/>
@@ -9690,33 +9658,22 @@
                 <a:latin typeface="Arial" panose="020B0604020202020204" pitchFamily="34" charset="0"/>
                 <a:cs typeface="Arial" panose="020B0604020202020204" pitchFamily="34" charset="0"/>
               </a:rPr>
-              <a:t>Le choix a été fait d’afficher les restaurants autour de la position de </a:t>
+              <a:t>Le choix a été fait d’afficher les restaurants autour de la position de l’utilisateur</a:t>
+            </a:r>
+            <a:r>
+              <a:rPr lang="fr-FR" dirty="0">
+                <a:latin typeface="Arial" panose="020B0604020202020204" pitchFamily="34" charset="0"/>
+                <a:cs typeface="Arial" panose="020B0604020202020204" pitchFamily="34" charset="0"/>
+              </a:rPr>
+              <a:t> </a:t>
             </a:r>
             <a:r>
               <a:rPr lang="fr-FR" dirty="0" smtClean="0">
                 <a:latin typeface="Arial" panose="020B0604020202020204" pitchFamily="34" charset="0"/>
                 <a:cs typeface="Arial" panose="020B0604020202020204" pitchFamily="34" charset="0"/>
               </a:rPr>
-              <a:t>l’utilisateur</a:t>
-            </a:r>
-            <a:r>
-              <a:rPr lang="fr-FR" dirty="0">
-                <a:latin typeface="Arial" panose="020B0604020202020204" pitchFamily="34" charset="0"/>
-                <a:cs typeface="Arial" panose="020B0604020202020204" pitchFamily="34" charset="0"/>
-              </a:rPr>
-              <a:t> </a:t>
-            </a:r>
-            <a:r>
-              <a:rPr lang="fr-FR" dirty="0" smtClean="0">
-                <a:latin typeface="Arial" panose="020B0604020202020204" pitchFamily="34" charset="0"/>
-                <a:cs typeface="Arial" panose="020B0604020202020204" pitchFamily="34" charset="0"/>
-              </a:rPr>
               <a:t>pour une utilisation rapide et plus directe des données.</a:t>
             </a:r>
-            <a:endParaRPr lang="fr-FR" dirty="0" smtClean="0">
-              <a:latin typeface="Arial" panose="020B0604020202020204" pitchFamily="34" charset="0"/>
-              <a:cs typeface="Arial" panose="020B0604020202020204" pitchFamily="34" charset="0"/>
-            </a:endParaRPr>
           </a:p>
         </p:txBody>
       </p:sp>
@@ -9803,7 +9760,7 @@
         <p:spPr>
           <a:xfrm>
             <a:off x="2347546" y="1251439"/>
-            <a:ext cx="9469316" cy="2308324"/>
+            <a:ext cx="9469316" cy="3139321"/>
           </a:xfrm>
           <a:prstGeom prst="rect">
             <a:avLst/>
@@ -9822,21 +9779,31 @@
                 <a:latin typeface="Arial" panose="020B0604020202020204" pitchFamily="34" charset="0"/>
                 <a:cs typeface="Arial" panose="020B0604020202020204" pitchFamily="34" charset="0"/>
               </a:rPr>
-              <a:t>Dans un cadre professionnel, utiliser le plugin vue2-google-maps pour gagner en confort, simplicité et </a:t>
+              <a:t>Dans un cadre professionnel, utiliser le plugin vue2-google-maps pour gagner en confort, simplicité et rapidité, ainsi que réduire la possibilité de bugs</a:t>
             </a:r>
             <a:r>
               <a:rPr lang="fr-FR" dirty="0" smtClean="0">
                 <a:latin typeface="Arial" panose="020B0604020202020204" pitchFamily="34" charset="0"/>
                 <a:cs typeface="Arial" panose="020B0604020202020204" pitchFamily="34" charset="0"/>
               </a:rPr>
-              <a:t>rapidité, ainsi que réduire la possibilit</a:t>
-            </a:r>
+              <a:t>.</a:t>
+            </a:r>
+          </a:p>
+          <a:p>
+            <a:pPr algn="just"/>
+            <a:endParaRPr lang="fr-FR" dirty="0">
+              <a:latin typeface="Arial" panose="020B0604020202020204" pitchFamily="34" charset="0"/>
+              <a:cs typeface="Arial" panose="020B0604020202020204" pitchFamily="34" charset="0"/>
+            </a:endParaRPr>
+          </a:p>
+          <a:p>
+            <a:pPr algn="just"/>
             <a:r>
               <a:rPr lang="fr-FR" dirty="0" smtClean="0">
                 <a:latin typeface="Arial" panose="020B0604020202020204" pitchFamily="34" charset="0"/>
                 <a:cs typeface="Arial" panose="020B0604020202020204" pitchFamily="34" charset="0"/>
               </a:rPr>
-              <a:t>é de bugs.</a:t>
+              <a:t>Peut-être étendre les fonctionnalités de Google Places si l’application était destinée à aussi référencer les bars.</a:t>
             </a:r>
             <a:endParaRPr lang="fr-FR" dirty="0" smtClean="0">
               <a:latin typeface="Arial" panose="020B0604020202020204" pitchFamily="34" charset="0"/>

</xml_diff>